<commit_message>
updated context picture, some spell corrections
</commit_message>
<xml_diff>
--- a/images/tuk2.pptx
+++ b/images/tuk2.pptx
@@ -6,13 +6,11 @@
   </p:sldMasterIdLst>
   <p:sldIdLst>
     <p:sldId id="256" r:id="rId2"/>
-    <p:sldId id="260" r:id="rId3"/>
-    <p:sldId id="261" r:id="rId4"/>
-    <p:sldId id="262" r:id="rId5"/>
-    <p:sldId id="263" r:id="rId6"/>
-    <p:sldId id="259" r:id="rId7"/>
-    <p:sldId id="258" r:id="rId8"/>
-    <p:sldId id="257" r:id="rId9"/>
+    <p:sldId id="264" r:id="rId3"/>
+    <p:sldId id="260" r:id="rId4"/>
+    <p:sldId id="261" r:id="rId5"/>
+    <p:sldId id="262" r:id="rId6"/>
+    <p:sldId id="263" r:id="rId7"/>
   </p:sldIdLst>
   <p:sldSz cx="9144000" cy="5143500" type="screen16x9"/>
   <p:notesSz cx="6858000" cy="9144000"/>
@@ -346,12 +344,12 @@
         </c:dLbls>
         <c:gapWidth val="150"/>
         <c:shape val="box"/>
-        <c:axId val="96751616"/>
-        <c:axId val="96753152"/>
-        <c:axId val="229035072"/>
+        <c:axId val="291393920"/>
+        <c:axId val="291395456"/>
+        <c:axId val="285827072"/>
       </c:bar3DChart>
       <c:catAx>
-        <c:axId val="96751616"/>
+        <c:axId val="291393920"/>
         <c:scaling>
           <c:orientation val="minMax"/>
         </c:scaling>
@@ -360,7 +358,7 @@
         <c:majorTickMark val="out"/>
         <c:minorTickMark val="none"/>
         <c:tickLblPos val="nextTo"/>
-        <c:crossAx val="96753152"/>
+        <c:crossAx val="291395456"/>
         <c:crosses val="autoZero"/>
         <c:auto val="1"/>
         <c:lblAlgn val="ctr"/>
@@ -368,7 +366,7 @@
         <c:noMultiLvlLbl val="0"/>
       </c:catAx>
       <c:valAx>
-        <c:axId val="96753152"/>
+        <c:axId val="291395456"/>
         <c:scaling>
           <c:orientation val="minMax"/>
         </c:scaling>
@@ -379,12 +377,12 @@
         <c:majorTickMark val="out"/>
         <c:minorTickMark val="none"/>
         <c:tickLblPos val="nextTo"/>
-        <c:crossAx val="96751616"/>
+        <c:crossAx val="291393920"/>
         <c:crosses val="autoZero"/>
         <c:crossBetween val="between"/>
       </c:valAx>
       <c:serAx>
-        <c:axId val="229035072"/>
+        <c:axId val="285827072"/>
         <c:scaling>
           <c:orientation val="minMax"/>
         </c:scaling>
@@ -393,7 +391,7 @@
         <c:majorTickMark val="out"/>
         <c:minorTickMark val="none"/>
         <c:tickLblPos val="nextTo"/>
-        <c:crossAx val="96753152"/>
+        <c:crossAx val="291395456"/>
         <c:crosses val="autoZero"/>
       </c:serAx>
       <c:spPr>
@@ -615,7 +613,7 @@
           <a:p>
             <a:fld id="{2E6D0048-3CBD-4728-AABD-495A016C3F65}" type="datetimeFigureOut">
               <a:rPr lang="de-DE" smtClean="0"/>
-              <a:t>12.03.2013</a:t>
+              <a:t>13.03.2013</a:t>
             </a:fld>
             <a:endParaRPr lang="de-DE"/>
           </a:p>
@@ -785,7 +783,7 @@
           <a:p>
             <a:fld id="{2E6D0048-3CBD-4728-AABD-495A016C3F65}" type="datetimeFigureOut">
               <a:rPr lang="de-DE" smtClean="0"/>
-              <a:t>12.03.2013</a:t>
+              <a:t>13.03.2013</a:t>
             </a:fld>
             <a:endParaRPr lang="de-DE"/>
           </a:p>
@@ -965,7 +963,7 @@
           <a:p>
             <a:fld id="{2E6D0048-3CBD-4728-AABD-495A016C3F65}" type="datetimeFigureOut">
               <a:rPr lang="de-DE" smtClean="0"/>
-              <a:t>12.03.2013</a:t>
+              <a:t>13.03.2013</a:t>
             </a:fld>
             <a:endParaRPr lang="de-DE"/>
           </a:p>
@@ -1135,7 +1133,7 @@
           <a:p>
             <a:fld id="{2E6D0048-3CBD-4728-AABD-495A016C3F65}" type="datetimeFigureOut">
               <a:rPr lang="de-DE" smtClean="0"/>
-              <a:t>12.03.2013</a:t>
+              <a:t>13.03.2013</a:t>
             </a:fld>
             <a:endParaRPr lang="de-DE"/>
           </a:p>
@@ -1381,7 +1379,7 @@
           <a:p>
             <a:fld id="{2E6D0048-3CBD-4728-AABD-495A016C3F65}" type="datetimeFigureOut">
               <a:rPr lang="de-DE" smtClean="0"/>
-              <a:t>12.03.2013</a:t>
+              <a:t>13.03.2013</a:t>
             </a:fld>
             <a:endParaRPr lang="de-DE"/>
           </a:p>
@@ -1669,7 +1667,7 @@
           <a:p>
             <a:fld id="{2E6D0048-3CBD-4728-AABD-495A016C3F65}" type="datetimeFigureOut">
               <a:rPr lang="de-DE" smtClean="0"/>
-              <a:t>12.03.2013</a:t>
+              <a:t>13.03.2013</a:t>
             </a:fld>
             <a:endParaRPr lang="de-DE"/>
           </a:p>
@@ -2091,7 +2089,7 @@
           <a:p>
             <a:fld id="{2E6D0048-3CBD-4728-AABD-495A016C3F65}" type="datetimeFigureOut">
               <a:rPr lang="de-DE" smtClean="0"/>
-              <a:t>12.03.2013</a:t>
+              <a:t>13.03.2013</a:t>
             </a:fld>
             <a:endParaRPr lang="de-DE"/>
           </a:p>
@@ -2209,7 +2207,7 @@
           <a:p>
             <a:fld id="{2E6D0048-3CBD-4728-AABD-495A016C3F65}" type="datetimeFigureOut">
               <a:rPr lang="de-DE" smtClean="0"/>
-              <a:t>12.03.2013</a:t>
+              <a:t>13.03.2013</a:t>
             </a:fld>
             <a:endParaRPr lang="de-DE"/>
           </a:p>
@@ -2304,7 +2302,7 @@
           <a:p>
             <a:fld id="{2E6D0048-3CBD-4728-AABD-495A016C3F65}" type="datetimeFigureOut">
               <a:rPr lang="de-DE" smtClean="0"/>
-              <a:t>12.03.2013</a:t>
+              <a:t>13.03.2013</a:t>
             </a:fld>
             <a:endParaRPr lang="de-DE"/>
           </a:p>
@@ -2581,7 +2579,7 @@
           <a:p>
             <a:fld id="{2E6D0048-3CBD-4728-AABD-495A016C3F65}" type="datetimeFigureOut">
               <a:rPr lang="de-DE" smtClean="0"/>
-              <a:t>12.03.2013</a:t>
+              <a:t>13.03.2013</a:t>
             </a:fld>
             <a:endParaRPr lang="de-DE"/>
           </a:p>
@@ -2834,7 +2832,7 @@
           <a:p>
             <a:fld id="{2E6D0048-3CBD-4728-AABD-495A016C3F65}" type="datetimeFigureOut">
               <a:rPr lang="de-DE" smtClean="0"/>
-              <a:t>12.03.2013</a:t>
+              <a:t>13.03.2013</a:t>
             </a:fld>
             <a:endParaRPr lang="de-DE"/>
           </a:p>
@@ -3047,7 +3045,7 @@
           <a:p>
             <a:fld id="{2E6D0048-3CBD-4728-AABD-495A016C3F65}" type="datetimeFigureOut">
               <a:rPr lang="de-DE" smtClean="0"/>
-              <a:t>12.03.2013</a:t>
+              <a:t>13.03.2013</a:t>
             </a:fld>
             <a:endParaRPr lang="de-DE"/>
           </a:p>
@@ -4253,6 +4251,786 @@
 </file>
 
 <file path=ppt/slides/slide2.xml><?xml version="1.0" encoding="utf-8"?>
+<p:sld xmlns:a="http://schemas.openxmlformats.org/drawingml/2006/main" xmlns:r="http://schemas.openxmlformats.org/officeDocument/2006/relationships" xmlns:p="http://schemas.openxmlformats.org/presentationml/2006/main">
+  <p:cSld>
+    <p:spTree>
+      <p:nvGrpSpPr>
+        <p:cNvPr id="1" name=""/>
+        <p:cNvGrpSpPr/>
+        <p:nvPr/>
+      </p:nvGrpSpPr>
+      <p:grpSpPr>
+        <a:xfrm>
+          <a:off x="0" y="0"/>
+          <a:ext cx="0" cy="0"/>
+          <a:chOff x="0" y="0"/>
+          <a:chExt cx="0" cy="0"/>
+        </a:xfrm>
+      </p:grpSpPr>
+      <p:sp>
+        <p:nvSpPr>
+          <p:cNvPr id="8" name="TextBox 7"/>
+          <p:cNvSpPr txBox="1"/>
+          <p:nvPr/>
+        </p:nvSpPr>
+        <p:spPr>
+          <a:xfrm>
+            <a:off x="0" y="267494"/>
+            <a:ext cx="9144000" cy="4662815"/>
+          </a:xfrm>
+          <a:prstGeom prst="rect">
+            <a:avLst/>
+          </a:prstGeom>
+          <a:noFill/>
+        </p:spPr>
+        <p:txBody>
+          <a:bodyPr wrap="square" rtlCol="0">
+            <a:spAutoFit/>
+          </a:bodyPr>
+          <a:lstStyle/>
+          <a:p>
+            <a:r>
+              <a:rPr lang="de-DE" sz="2700" dirty="0" err="1" smtClean="0">
+                <a:solidFill>
+                  <a:schemeClr val="accent2">
+                    <a:lumMod val="75000"/>
+                  </a:schemeClr>
+                </a:solidFill>
+              </a:rPr>
+              <a:t>protected</a:t>
+            </a:r>
+            <a:r>
+              <a:rPr lang="de-DE" sz="2700" dirty="0" smtClean="0">
+                <a:solidFill>
+                  <a:schemeClr val="accent2">
+                    <a:lumMod val="75000"/>
+                  </a:schemeClr>
+                </a:solidFill>
+              </a:rPr>
+              <a:t> </a:t>
+            </a:r>
+            <a:r>
+              <a:rPr lang="de-DE" sz="2700" dirty="0">
+                <a:solidFill>
+                  <a:schemeClr val="tx2"/>
+                </a:solidFill>
+              </a:rPr>
+              <a:t>List</a:t>
+            </a:r>
+            <a:r>
+              <a:rPr lang="de-DE" sz="2700" dirty="0"/>
+              <a:t>&lt;</a:t>
+            </a:r>
+            <a:r>
+              <a:rPr lang="de-DE" sz="2700" dirty="0">
+                <a:solidFill>
+                  <a:schemeClr val="tx2"/>
+                </a:solidFill>
+              </a:rPr>
+              <a:t>String</a:t>
+            </a:r>
+            <a:r>
+              <a:rPr lang="de-DE" sz="2700" dirty="0"/>
+              <a:t>&gt; </a:t>
+            </a:r>
+            <a:r>
+              <a:rPr lang="de-DE" sz="2700" dirty="0" err="1"/>
+              <a:t>showMostSoldProducts</a:t>
+            </a:r>
+            <a:r>
+              <a:rPr lang="de-DE" sz="2700" dirty="0"/>
+              <a:t>(</a:t>
+            </a:r>
+            <a:r>
+              <a:rPr lang="de-DE" sz="2700" dirty="0">
+                <a:solidFill>
+                  <a:schemeClr val="tx2"/>
+                </a:solidFill>
+              </a:rPr>
+              <a:t>Integer</a:t>
+            </a:r>
+            <a:r>
+              <a:rPr lang="de-DE" sz="2700" dirty="0"/>
+              <a:t> </a:t>
+            </a:r>
+            <a:r>
+              <a:rPr lang="de-DE" sz="2700" dirty="0" err="1"/>
+              <a:t>year</a:t>
+            </a:r>
+            <a:r>
+              <a:rPr lang="de-DE" sz="2700" dirty="0" smtClean="0"/>
+              <a:t>){</a:t>
+            </a:r>
+          </a:p>
+          <a:p>
+            <a:r>
+              <a:rPr lang="de-DE" sz="2700" dirty="0" smtClean="0">
+                <a:solidFill>
+                  <a:schemeClr val="tx2"/>
+                </a:solidFill>
+              </a:rPr>
+              <a:t>        List</a:t>
+            </a:r>
+            <a:r>
+              <a:rPr lang="de-DE" sz="2700" dirty="0" smtClean="0"/>
+              <a:t>&lt;</a:t>
+            </a:r>
+            <a:r>
+              <a:rPr lang="de-DE" sz="2700" dirty="0" smtClean="0">
+                <a:solidFill>
+                  <a:schemeClr val="tx2"/>
+                </a:solidFill>
+              </a:rPr>
+              <a:t>String</a:t>
+            </a:r>
+            <a:r>
+              <a:rPr lang="de-DE" sz="2700" dirty="0"/>
+              <a:t>&gt; </a:t>
+            </a:r>
+            <a:r>
+              <a:rPr lang="de-DE" sz="2700" dirty="0" err="1">
+                <a:solidFill>
+                  <a:schemeClr val="accent3">
+                    <a:lumMod val="75000"/>
+                  </a:schemeClr>
+                </a:solidFill>
+              </a:rPr>
+              <a:t>result</a:t>
+            </a:r>
+            <a:r>
+              <a:rPr lang="de-DE" sz="2700" dirty="0"/>
+              <a:t> = </a:t>
+            </a:r>
+            <a:r>
+              <a:rPr lang="de-DE" sz="2700" dirty="0" err="1"/>
+              <a:t>this.</a:t>
+            </a:r>
+            <a:r>
+              <a:rPr lang="de-DE" sz="2700" dirty="0" err="1">
+                <a:solidFill>
+                  <a:schemeClr val="bg1">
+                    <a:lumMod val="50000"/>
+                  </a:schemeClr>
+                </a:solidFill>
+              </a:rPr>
+              <a:t>execute</a:t>
+            </a:r>
+            <a:r>
+              <a:rPr lang="de-DE" sz="2700" dirty="0"/>
+              <a:t>(</a:t>
+            </a:r>
+          </a:p>
+          <a:p>
+            <a:r>
+              <a:rPr lang="en-US" sz="2700" dirty="0" smtClean="0"/>
+              <a:t>            "</a:t>
+            </a:r>
+            <a:r>
+              <a:rPr lang="en-US" sz="2700" dirty="0">
+                <a:solidFill>
+                  <a:schemeClr val="accent4">
+                    <a:lumMod val="75000"/>
+                  </a:schemeClr>
+                </a:solidFill>
+              </a:rPr>
+              <a:t>SELECT</a:t>
+            </a:r>
+            <a:r>
+              <a:rPr lang="en-US" sz="2700" dirty="0"/>
+              <a:t> product, sum(value) </a:t>
+            </a:r>
+            <a:r>
+              <a:rPr lang="en-US" sz="2700" dirty="0">
+                <a:solidFill>
+                  <a:schemeClr val="accent4">
+                    <a:lumMod val="75000"/>
+                  </a:schemeClr>
+                </a:solidFill>
+              </a:rPr>
+              <a:t>AS</a:t>
+            </a:r>
+            <a:r>
+              <a:rPr lang="en-US" sz="2700" dirty="0"/>
+              <a:t> value </a:t>
+            </a:r>
+            <a:r>
+              <a:rPr lang="en-US" sz="2700" dirty="0">
+                <a:solidFill>
+                  <a:schemeClr val="accent4">
+                    <a:lumMod val="75000"/>
+                  </a:schemeClr>
+                </a:solidFill>
+              </a:rPr>
+              <a:t>FROM</a:t>
+            </a:r>
+            <a:r>
+              <a:rPr lang="en-US" sz="2700" dirty="0"/>
+              <a:t>" +</a:t>
+            </a:r>
+          </a:p>
+          <a:p>
+            <a:r>
+              <a:rPr lang="en-US" sz="2700" dirty="0" smtClean="0"/>
+              <a:t>            "</a:t>
+            </a:r>
+            <a:r>
+              <a:rPr lang="en-US" sz="2700" dirty="0"/>
+              <a:t>orders </a:t>
+            </a:r>
+            <a:r>
+              <a:rPr lang="en-US" sz="2700" dirty="0">
+                <a:solidFill>
+                  <a:schemeClr val="accent4">
+                    <a:lumMod val="75000"/>
+                  </a:schemeClr>
+                </a:solidFill>
+              </a:rPr>
+              <a:t>JOIN</a:t>
+            </a:r>
+            <a:r>
+              <a:rPr lang="en-US" sz="2700" dirty="0"/>
+              <a:t> products </a:t>
+            </a:r>
+            <a:r>
+              <a:rPr lang="en-US" sz="2700" dirty="0">
+                <a:solidFill>
+                  <a:schemeClr val="accent4">
+                    <a:lumMod val="75000"/>
+                  </a:schemeClr>
+                </a:solidFill>
+              </a:rPr>
+              <a:t>ON</a:t>
+            </a:r>
+            <a:r>
+              <a:rPr lang="en-US" sz="2700" dirty="0"/>
+              <a:t> </a:t>
+            </a:r>
+            <a:r>
+              <a:rPr lang="en-US" sz="2700" dirty="0" err="1"/>
+              <a:t>orders.pid</a:t>
+            </a:r>
+            <a:r>
+              <a:rPr lang="en-US" sz="2700" dirty="0"/>
+              <a:t> = </a:t>
+            </a:r>
+            <a:r>
+              <a:rPr lang="en-US" sz="2700" dirty="0" err="1"/>
+              <a:t>products.pid</a:t>
+            </a:r>
+            <a:r>
+              <a:rPr lang="en-US" sz="2700" dirty="0"/>
+              <a:t>" +</a:t>
+            </a:r>
+          </a:p>
+          <a:p>
+            <a:r>
+              <a:rPr lang="en-US" sz="2700" dirty="0" smtClean="0"/>
+              <a:t>            "</a:t>
+            </a:r>
+            <a:r>
+              <a:rPr lang="en-US" sz="2700" dirty="0">
+                <a:solidFill>
+                  <a:schemeClr val="accent4">
+                    <a:lumMod val="75000"/>
+                  </a:schemeClr>
+                </a:solidFill>
+              </a:rPr>
+              <a:t>WHERE</a:t>
+            </a:r>
+            <a:r>
+              <a:rPr lang="en-US" sz="2700" dirty="0"/>
+              <a:t> year=%d </a:t>
+            </a:r>
+            <a:r>
+              <a:rPr lang="en-US" sz="2700" dirty="0">
+                <a:solidFill>
+                  <a:schemeClr val="accent4">
+                    <a:lumMod val="75000"/>
+                  </a:schemeClr>
+                </a:solidFill>
+              </a:rPr>
+              <a:t>AND</a:t>
+            </a:r>
+            <a:r>
+              <a:rPr lang="en-US" sz="2700" dirty="0"/>
+              <a:t> company=%s </a:t>
+            </a:r>
+            <a:r>
+              <a:rPr lang="en-US" sz="2700" dirty="0">
+                <a:solidFill>
+                  <a:schemeClr val="accent4">
+                    <a:lumMod val="75000"/>
+                  </a:schemeClr>
+                </a:solidFill>
+              </a:rPr>
+              <a:t>GROUP BY</a:t>
+            </a:r>
+            <a:r>
+              <a:rPr lang="en-US" sz="2700" dirty="0"/>
+              <a:t> product</a:t>
+            </a:r>
+            <a:r>
+              <a:rPr lang="en-US" sz="2700" dirty="0" smtClean="0"/>
+              <a:t>"</a:t>
+            </a:r>
+            <a:r>
+              <a:rPr lang="de-DE" sz="2700" dirty="0" smtClean="0"/>
+              <a:t>,</a:t>
+            </a:r>
+          </a:p>
+          <a:p>
+            <a:r>
+              <a:rPr lang="de-DE" sz="2700" dirty="0" smtClean="0"/>
+              <a:t>            </a:t>
+            </a:r>
+            <a:r>
+              <a:rPr lang="de-DE" sz="2700" dirty="0" err="1" smtClean="0"/>
+              <a:t>year</a:t>
+            </a:r>
+            <a:r>
+              <a:rPr lang="de-DE" sz="2700" dirty="0"/>
+              <a:t>, </a:t>
+            </a:r>
+            <a:r>
+              <a:rPr lang="de-DE" sz="2700" dirty="0" err="1" smtClean="0"/>
+              <a:t>Settings.company</a:t>
+            </a:r>
+            <a:r>
+              <a:rPr lang="de-DE" sz="2700" dirty="0" smtClean="0"/>
+              <a:t>);</a:t>
+            </a:r>
+            <a:endParaRPr lang="de-DE" sz="2700" dirty="0"/>
+          </a:p>
+          <a:p>
+            <a:r>
+              <a:rPr lang="de-DE" sz="2700" dirty="0" smtClean="0"/>
+              <a:t>        </a:t>
+            </a:r>
+            <a:r>
+              <a:rPr lang="de-DE" sz="2700" dirty="0" err="1" smtClean="0">
+                <a:solidFill>
+                  <a:schemeClr val="accent2">
+                    <a:lumMod val="75000"/>
+                  </a:schemeClr>
+                </a:solidFill>
+              </a:rPr>
+              <a:t>if</a:t>
+            </a:r>
+            <a:r>
+              <a:rPr lang="de-DE" sz="2700" dirty="0" smtClean="0"/>
+              <a:t>(</a:t>
+            </a:r>
+            <a:r>
+              <a:rPr lang="de-DE" sz="2700" dirty="0" err="1" smtClean="0">
+                <a:solidFill>
+                  <a:schemeClr val="accent3">
+                    <a:lumMod val="75000"/>
+                  </a:schemeClr>
+                </a:solidFill>
+              </a:rPr>
+              <a:t>result</a:t>
+            </a:r>
+            <a:r>
+              <a:rPr lang="de-DE" sz="2700" dirty="0" err="1" smtClean="0"/>
+              <a:t>.</a:t>
+            </a:r>
+            <a:r>
+              <a:rPr lang="de-DE" sz="2700" dirty="0" err="1" smtClean="0">
+                <a:solidFill>
+                  <a:schemeClr val="bg1">
+                    <a:lumMod val="50000"/>
+                  </a:schemeClr>
+                </a:solidFill>
+              </a:rPr>
+              <a:t>size</a:t>
+            </a:r>
+            <a:r>
+              <a:rPr lang="de-DE" sz="2700" dirty="0"/>
+              <a:t>() == 0){</a:t>
+            </a:r>
+          </a:p>
+          <a:p>
+            <a:r>
+              <a:rPr lang="en-US" sz="2700" dirty="0" smtClean="0"/>
+              <a:t>            </a:t>
+            </a:r>
+            <a:r>
+              <a:rPr lang="en-US" sz="2700" dirty="0" smtClean="0">
+                <a:solidFill>
+                  <a:schemeClr val="accent2">
+                    <a:lumMod val="75000"/>
+                  </a:schemeClr>
+                </a:solidFill>
+              </a:rPr>
+              <a:t>throw </a:t>
+            </a:r>
+            <a:r>
+              <a:rPr lang="en-US" sz="2700" dirty="0">
+                <a:solidFill>
+                  <a:schemeClr val="accent2">
+                    <a:lumMod val="75000"/>
+                  </a:schemeClr>
+                </a:solidFill>
+              </a:rPr>
+              <a:t>new</a:t>
+            </a:r>
+            <a:r>
+              <a:rPr lang="en-US" sz="2700" dirty="0"/>
+              <a:t> </a:t>
+            </a:r>
+            <a:r>
+              <a:rPr lang="en-US" sz="2700" dirty="0" err="1">
+                <a:solidFill>
+                  <a:schemeClr val="tx2"/>
+                </a:solidFill>
+              </a:rPr>
+              <a:t>RuntimeException</a:t>
+            </a:r>
+            <a:r>
+              <a:rPr lang="en-US" sz="2700" dirty="0"/>
+              <a:t>("no values fetched");</a:t>
+            </a:r>
+          </a:p>
+          <a:p>
+            <a:r>
+              <a:rPr lang="de-DE" sz="2700" dirty="0" smtClean="0"/>
+              <a:t>        }</a:t>
+            </a:r>
+            <a:r>
+              <a:rPr lang="de-DE" sz="2700" dirty="0" err="1">
+                <a:solidFill>
+                  <a:schemeClr val="accent2">
+                    <a:lumMod val="75000"/>
+                  </a:schemeClr>
+                </a:solidFill>
+              </a:rPr>
+              <a:t>else</a:t>
+            </a:r>
+            <a:endParaRPr lang="de-DE" sz="2700" dirty="0">
+              <a:solidFill>
+                <a:schemeClr val="accent2">
+                  <a:lumMod val="75000"/>
+                </a:schemeClr>
+              </a:solidFill>
+            </a:endParaRPr>
+          </a:p>
+          <a:p>
+            <a:r>
+              <a:rPr lang="de-DE" sz="2700" dirty="0" smtClean="0"/>
+              <a:t>            </a:t>
+            </a:r>
+            <a:r>
+              <a:rPr lang="de-DE" sz="2700" dirty="0" err="1" smtClean="0">
+                <a:solidFill>
+                  <a:schemeClr val="accent2">
+                    <a:lumMod val="75000"/>
+                  </a:schemeClr>
+                </a:solidFill>
+              </a:rPr>
+              <a:t>return</a:t>
+            </a:r>
+            <a:r>
+              <a:rPr lang="de-DE" sz="2700" dirty="0" smtClean="0">
+                <a:solidFill>
+                  <a:schemeClr val="accent2">
+                    <a:lumMod val="75000"/>
+                  </a:schemeClr>
+                </a:solidFill>
+              </a:rPr>
+              <a:t> </a:t>
+            </a:r>
+            <a:r>
+              <a:rPr lang="de-DE" sz="2700" dirty="0" err="1">
+                <a:solidFill>
+                  <a:schemeClr val="accent3">
+                    <a:lumMod val="75000"/>
+                  </a:schemeClr>
+                </a:solidFill>
+              </a:rPr>
+              <a:t>result</a:t>
+            </a:r>
+            <a:r>
+              <a:rPr lang="de-DE" sz="2700" dirty="0" smtClean="0"/>
+              <a:t>;</a:t>
+            </a:r>
+          </a:p>
+          <a:p>
+            <a:r>
+              <a:rPr lang="de-DE" sz="2700" dirty="0" smtClean="0"/>
+              <a:t>}</a:t>
+            </a:r>
+            <a:endParaRPr lang="de-DE" sz="2700" dirty="0" smtClean="0"/>
+          </a:p>
+        </p:txBody>
+      </p:sp>
+      <p:sp>
+        <p:nvSpPr>
+          <p:cNvPr id="10" name="Rectangle 9"/>
+          <p:cNvSpPr/>
+          <p:nvPr/>
+        </p:nvSpPr>
+        <p:spPr>
+          <a:xfrm>
+            <a:off x="3508185" y="778383"/>
+            <a:ext cx="523695" cy="300050"/>
+          </a:xfrm>
+          <a:prstGeom prst="rect">
+            <a:avLst/>
+          </a:prstGeom>
+          <a:solidFill>
+            <a:srgbClr val="FF0000">
+              <a:alpha val="54902"/>
+            </a:srgbClr>
+          </a:solidFill>
+          <a:ln>
+            <a:noFill/>
+          </a:ln>
+        </p:spPr>
+        <p:style>
+          <a:lnRef idx="2">
+            <a:schemeClr val="accent1">
+              <a:shade val="50000"/>
+            </a:schemeClr>
+          </a:lnRef>
+          <a:fillRef idx="1">
+            <a:schemeClr val="accent1"/>
+          </a:fillRef>
+          <a:effectRef idx="0">
+            <a:schemeClr val="accent1"/>
+          </a:effectRef>
+          <a:fontRef idx="minor">
+            <a:schemeClr val="lt1"/>
+          </a:fontRef>
+        </p:style>
+        <p:txBody>
+          <a:bodyPr rtlCol="0" anchor="ctr"/>
+          <a:lstStyle/>
+          <a:p>
+            <a:pPr algn="ctr"/>
+            <a:endParaRPr lang="de-DE"/>
+          </a:p>
+        </p:txBody>
+      </p:sp>
+      <p:sp>
+        <p:nvSpPr>
+          <p:cNvPr id="13" name="Rectangle 12"/>
+          <p:cNvSpPr/>
+          <p:nvPr/>
+        </p:nvSpPr>
+        <p:spPr>
+          <a:xfrm>
+            <a:off x="7653187" y="397871"/>
+            <a:ext cx="633672" cy="300050"/>
+          </a:xfrm>
+          <a:prstGeom prst="rect">
+            <a:avLst/>
+          </a:prstGeom>
+          <a:solidFill>
+            <a:srgbClr val="FF0000">
+              <a:alpha val="54902"/>
+            </a:srgbClr>
+          </a:solidFill>
+          <a:ln>
+            <a:noFill/>
+          </a:ln>
+        </p:spPr>
+        <p:style>
+          <a:lnRef idx="2">
+            <a:schemeClr val="accent1">
+              <a:shade val="50000"/>
+            </a:schemeClr>
+          </a:lnRef>
+          <a:fillRef idx="1">
+            <a:schemeClr val="accent1"/>
+          </a:fillRef>
+          <a:effectRef idx="0">
+            <a:schemeClr val="accent1"/>
+          </a:effectRef>
+          <a:fontRef idx="minor">
+            <a:schemeClr val="lt1"/>
+          </a:fontRef>
+        </p:style>
+        <p:txBody>
+          <a:bodyPr rtlCol="0" anchor="ctr"/>
+          <a:lstStyle/>
+          <a:p>
+            <a:pPr algn="ctr"/>
+            <a:endParaRPr lang="de-DE"/>
+          </a:p>
+        </p:txBody>
+      </p:sp>
+      <p:sp>
+        <p:nvSpPr>
+          <p:cNvPr id="14" name="Rectangle 13"/>
+          <p:cNvSpPr/>
+          <p:nvPr/>
+        </p:nvSpPr>
+        <p:spPr>
+          <a:xfrm>
+            <a:off x="1731307" y="2446852"/>
+            <a:ext cx="2494746" cy="330055"/>
+          </a:xfrm>
+          <a:prstGeom prst="rect">
+            <a:avLst/>
+          </a:prstGeom>
+          <a:solidFill>
+            <a:srgbClr val="FF0000">
+              <a:alpha val="54902"/>
+            </a:srgbClr>
+          </a:solidFill>
+          <a:ln>
+            <a:noFill/>
+          </a:ln>
+        </p:spPr>
+        <p:style>
+          <a:lnRef idx="2">
+            <a:schemeClr val="accent1">
+              <a:shade val="50000"/>
+            </a:schemeClr>
+          </a:lnRef>
+          <a:fillRef idx="1">
+            <a:schemeClr val="accent1"/>
+          </a:fillRef>
+          <a:effectRef idx="0">
+            <a:schemeClr val="accent1"/>
+          </a:effectRef>
+          <a:fontRef idx="minor">
+            <a:schemeClr val="lt1"/>
+          </a:fontRef>
+        </p:style>
+        <p:txBody>
+          <a:bodyPr rtlCol="0" anchor="ctr"/>
+          <a:lstStyle/>
+          <a:p>
+            <a:pPr algn="ctr"/>
+            <a:endParaRPr lang="de-DE"/>
+          </a:p>
+        </p:txBody>
+      </p:sp>
+      <p:sp>
+        <p:nvSpPr>
+          <p:cNvPr id="2" name="Flowchart: Magnetic Disk 1"/>
+          <p:cNvSpPr/>
+          <p:nvPr/>
+        </p:nvSpPr>
+        <p:spPr>
+          <a:xfrm>
+            <a:off x="7164288" y="3808275"/>
+            <a:ext cx="1800200" cy="1211747"/>
+          </a:xfrm>
+          <a:prstGeom prst="flowChartMagneticDisk">
+            <a:avLst/>
+          </a:prstGeom>
+          <a:solidFill>
+            <a:srgbClr val="FF0000">
+              <a:alpha val="54902"/>
+            </a:srgbClr>
+          </a:solidFill>
+          <a:ln>
+            <a:solidFill>
+              <a:schemeClr val="tx1"/>
+            </a:solidFill>
+          </a:ln>
+        </p:spPr>
+        <p:style>
+          <a:lnRef idx="2">
+            <a:schemeClr val="accent1">
+              <a:shade val="50000"/>
+            </a:schemeClr>
+          </a:lnRef>
+          <a:fillRef idx="1">
+            <a:schemeClr val="accent1"/>
+          </a:fillRef>
+          <a:effectRef idx="0">
+            <a:schemeClr val="accent1"/>
+          </a:effectRef>
+          <a:fontRef idx="minor">
+            <a:schemeClr val="lt1"/>
+          </a:fontRef>
+        </p:style>
+        <p:txBody>
+          <a:bodyPr rtlCol="0" anchor="ctr"/>
+          <a:lstStyle/>
+          <a:p>
+            <a:pPr algn="ctr"/>
+            <a:r>
+              <a:rPr lang="de-DE" sz="4000" dirty="0" smtClean="0">
+                <a:solidFill>
+                  <a:schemeClr val="tx1"/>
+                </a:solidFill>
+              </a:rPr>
+              <a:t>DB</a:t>
+            </a:r>
+            <a:endParaRPr lang="de-DE" sz="4000" dirty="0">
+              <a:solidFill>
+                <a:schemeClr val="tx1"/>
+              </a:solidFill>
+            </a:endParaRPr>
+          </a:p>
+        </p:txBody>
+      </p:sp>
+      <p:sp>
+        <p:nvSpPr>
+          <p:cNvPr id="7" name="Rectangle 6"/>
+          <p:cNvSpPr/>
+          <p:nvPr/>
+        </p:nvSpPr>
+        <p:spPr>
+          <a:xfrm>
+            <a:off x="987685" y="2448667"/>
+            <a:ext cx="697039" cy="330055"/>
+          </a:xfrm>
+          <a:prstGeom prst="rect">
+            <a:avLst/>
+          </a:prstGeom>
+          <a:solidFill>
+            <a:srgbClr val="FF0000">
+              <a:alpha val="54902"/>
+            </a:srgbClr>
+          </a:solidFill>
+          <a:ln>
+            <a:noFill/>
+          </a:ln>
+        </p:spPr>
+        <p:style>
+          <a:lnRef idx="2">
+            <a:schemeClr val="accent1">
+              <a:shade val="50000"/>
+            </a:schemeClr>
+          </a:lnRef>
+          <a:fillRef idx="1">
+            <a:schemeClr val="accent1"/>
+          </a:fillRef>
+          <a:effectRef idx="0">
+            <a:schemeClr val="accent1"/>
+          </a:effectRef>
+          <a:fontRef idx="minor">
+            <a:schemeClr val="lt1"/>
+          </a:fontRef>
+        </p:style>
+        <p:txBody>
+          <a:bodyPr rtlCol="0" anchor="ctr"/>
+          <a:lstStyle/>
+          <a:p>
+            <a:pPr algn="ctr"/>
+            <a:endParaRPr lang="de-DE"/>
+          </a:p>
+        </p:txBody>
+      </p:sp>
+    </p:spTree>
+    <p:extLst>
+      <p:ext uri="{BB962C8B-B14F-4D97-AF65-F5344CB8AC3E}">
+        <p14:creationId xmlns:p14="http://schemas.microsoft.com/office/powerpoint/2010/main" val="1421121182"/>
+      </p:ext>
+    </p:extLst>
+  </p:cSld>
+  <p:clrMapOvr>
+    <a:masterClrMapping/>
+  </p:clrMapOvr>
+</p:sld>
+</file>
+
+<file path=ppt/slides/slide3.xml><?xml version="1.0" encoding="utf-8"?>
 <p:sld xmlns:a="http://schemas.openxmlformats.org/drawingml/2006/main" xmlns:r="http://schemas.openxmlformats.org/officeDocument/2006/relationships" xmlns:p="http://schemas.openxmlformats.org/presentationml/2006/main">
   <p:cSld>
     <p:spTree>
@@ -5500,14 +6278,14 @@
       </p:graphicFrame>
       <p:sp>
         <p:nvSpPr>
-          <p:cNvPr id="3" name="Rectangle 2"/>
+          <p:cNvPr id="15" name="Rectangle 14"/>
           <p:cNvSpPr/>
           <p:nvPr/>
         </p:nvSpPr>
         <p:spPr>
           <a:xfrm>
             <a:off x="8532440" y="1037637"/>
-            <a:ext cx="151331" cy="1508687"/>
+            <a:ext cx="151331" cy="1102065"/>
           </a:xfrm>
           <a:prstGeom prst="rect">
             <a:avLst/>
@@ -5548,14 +6326,14 @@
       </p:sp>
       <p:sp>
         <p:nvSpPr>
-          <p:cNvPr id="14" name="Rectangle 13"/>
+          <p:cNvPr id="16" name="Rectangle 15"/>
           <p:cNvSpPr/>
           <p:nvPr/>
         </p:nvSpPr>
         <p:spPr>
           <a:xfrm>
-            <a:off x="8533509" y="2633440"/>
-            <a:ext cx="150262" cy="384987"/>
+            <a:off x="8533509" y="2163847"/>
+            <a:ext cx="150262" cy="349988"/>
           </a:xfrm>
           <a:prstGeom prst="rect">
             <a:avLst/>
@@ -5592,6 +6370,54 @@
           </a:p>
         </p:txBody>
       </p:sp>
+      <p:sp>
+        <p:nvSpPr>
+          <p:cNvPr id="17" name="Rectangle 16"/>
+          <p:cNvSpPr/>
+          <p:nvPr/>
+        </p:nvSpPr>
+        <p:spPr>
+          <a:xfrm>
+            <a:off x="8527155" y="2536122"/>
+            <a:ext cx="151331" cy="467676"/>
+          </a:xfrm>
+          <a:prstGeom prst="rect">
+            <a:avLst/>
+          </a:prstGeom>
+          <a:solidFill>
+            <a:schemeClr val="accent3">
+              <a:lumMod val="75000"/>
+            </a:schemeClr>
+          </a:solidFill>
+          <a:ln>
+            <a:noFill/>
+          </a:ln>
+        </p:spPr>
+        <p:style>
+          <a:lnRef idx="2">
+            <a:schemeClr val="accent1">
+              <a:shade val="50000"/>
+            </a:schemeClr>
+          </a:lnRef>
+          <a:fillRef idx="1">
+            <a:schemeClr val="accent1"/>
+          </a:fillRef>
+          <a:effectRef idx="0">
+            <a:schemeClr val="accent1"/>
+          </a:effectRef>
+          <a:fontRef idx="minor">
+            <a:schemeClr val="lt1"/>
+          </a:fontRef>
+        </p:style>
+        <p:txBody>
+          <a:bodyPr rtlCol="0" anchor="ctr"/>
+          <a:lstStyle/>
+          <a:p>
+            <a:pPr algn="ctr"/>
+            <a:endParaRPr lang="de-DE"/>
+          </a:p>
+        </p:txBody>
+      </p:sp>
     </p:spTree>
     <p:extLst>
       <p:ext uri="{BB962C8B-B14F-4D97-AF65-F5344CB8AC3E}">
@@ -5605,7 +6431,7 @@
 </p:sld>
 </file>
 
-<file path=ppt/slides/slide3.xml><?xml version="1.0" encoding="utf-8"?>
+<file path=ppt/slides/slide4.xml><?xml version="1.0" encoding="utf-8"?>
 <p:sld xmlns:a="http://schemas.openxmlformats.org/drawingml/2006/main" xmlns:r="http://schemas.openxmlformats.org/officeDocument/2006/relationships" xmlns:p="http://schemas.openxmlformats.org/presentationml/2006/main">
   <p:cSld>
     <p:spTree>
@@ -6967,100 +7793,6 @@
       </p:graphicFrame>
       <p:sp>
         <p:nvSpPr>
-          <p:cNvPr id="3" name="Rectangle 2"/>
-          <p:cNvSpPr/>
-          <p:nvPr/>
-        </p:nvSpPr>
-        <p:spPr>
-          <a:xfrm>
-            <a:off x="8532440" y="1037637"/>
-            <a:ext cx="151331" cy="1508687"/>
-          </a:xfrm>
-          <a:prstGeom prst="rect">
-            <a:avLst/>
-          </a:prstGeom>
-          <a:solidFill>
-            <a:schemeClr val="accent3">
-              <a:lumMod val="75000"/>
-            </a:schemeClr>
-          </a:solidFill>
-          <a:ln>
-            <a:noFill/>
-          </a:ln>
-        </p:spPr>
-        <p:style>
-          <a:lnRef idx="2">
-            <a:schemeClr val="accent1">
-              <a:shade val="50000"/>
-            </a:schemeClr>
-          </a:lnRef>
-          <a:fillRef idx="1">
-            <a:schemeClr val="accent1"/>
-          </a:fillRef>
-          <a:effectRef idx="0">
-            <a:schemeClr val="accent1"/>
-          </a:effectRef>
-          <a:fontRef idx="minor">
-            <a:schemeClr val="lt1"/>
-          </a:fontRef>
-        </p:style>
-        <p:txBody>
-          <a:bodyPr rtlCol="0" anchor="ctr"/>
-          <a:lstStyle/>
-          <a:p>
-            <a:pPr algn="ctr"/>
-            <a:endParaRPr lang="de-DE"/>
-          </a:p>
-        </p:txBody>
-      </p:sp>
-      <p:sp>
-        <p:nvSpPr>
-          <p:cNvPr id="14" name="Rectangle 13"/>
-          <p:cNvSpPr/>
-          <p:nvPr/>
-        </p:nvSpPr>
-        <p:spPr>
-          <a:xfrm>
-            <a:off x="8533509" y="2633440"/>
-            <a:ext cx="150262" cy="384987"/>
-          </a:xfrm>
-          <a:prstGeom prst="rect">
-            <a:avLst/>
-          </a:prstGeom>
-          <a:solidFill>
-            <a:srgbClr val="C00000"/>
-          </a:solidFill>
-          <a:ln>
-            <a:noFill/>
-          </a:ln>
-        </p:spPr>
-        <p:style>
-          <a:lnRef idx="2">
-            <a:schemeClr val="accent1">
-              <a:shade val="50000"/>
-            </a:schemeClr>
-          </a:lnRef>
-          <a:fillRef idx="1">
-            <a:schemeClr val="accent1"/>
-          </a:fillRef>
-          <a:effectRef idx="0">
-            <a:schemeClr val="accent1"/>
-          </a:effectRef>
-          <a:fontRef idx="minor">
-            <a:schemeClr val="lt1"/>
-          </a:fontRef>
-        </p:style>
-        <p:txBody>
-          <a:bodyPr rtlCol="0" anchor="ctr"/>
-          <a:lstStyle/>
-          <a:p>
-            <a:pPr algn="ctr"/>
-            <a:endParaRPr lang="de-DE"/>
-          </a:p>
-        </p:txBody>
-      </p:sp>
-      <p:sp>
-        <p:nvSpPr>
           <p:cNvPr id="16" name="Rectangle 15"/>
           <p:cNvSpPr/>
           <p:nvPr/>
@@ -7264,6 +7996,148 @@
           </a:graphicData>
         </a:graphic>
       </p:graphicFrame>
+      <p:sp>
+        <p:nvSpPr>
+          <p:cNvPr id="18" name="Rectangle 17"/>
+          <p:cNvSpPr/>
+          <p:nvPr/>
+        </p:nvSpPr>
+        <p:spPr>
+          <a:xfrm>
+            <a:off x="8532440" y="1037637"/>
+            <a:ext cx="151331" cy="1102065"/>
+          </a:xfrm>
+          <a:prstGeom prst="rect">
+            <a:avLst/>
+          </a:prstGeom>
+          <a:solidFill>
+            <a:schemeClr val="accent3">
+              <a:lumMod val="75000"/>
+            </a:schemeClr>
+          </a:solidFill>
+          <a:ln>
+            <a:noFill/>
+          </a:ln>
+        </p:spPr>
+        <p:style>
+          <a:lnRef idx="2">
+            <a:schemeClr val="accent1">
+              <a:shade val="50000"/>
+            </a:schemeClr>
+          </a:lnRef>
+          <a:fillRef idx="1">
+            <a:schemeClr val="accent1"/>
+          </a:fillRef>
+          <a:effectRef idx="0">
+            <a:schemeClr val="accent1"/>
+          </a:effectRef>
+          <a:fontRef idx="minor">
+            <a:schemeClr val="lt1"/>
+          </a:fontRef>
+        </p:style>
+        <p:txBody>
+          <a:bodyPr rtlCol="0" anchor="ctr"/>
+          <a:lstStyle/>
+          <a:p>
+            <a:pPr algn="ctr"/>
+            <a:endParaRPr lang="de-DE"/>
+          </a:p>
+        </p:txBody>
+      </p:sp>
+      <p:sp>
+        <p:nvSpPr>
+          <p:cNvPr id="19" name="Rectangle 18"/>
+          <p:cNvSpPr/>
+          <p:nvPr/>
+        </p:nvSpPr>
+        <p:spPr>
+          <a:xfrm>
+            <a:off x="8533509" y="2163847"/>
+            <a:ext cx="150262" cy="349988"/>
+          </a:xfrm>
+          <a:prstGeom prst="rect">
+            <a:avLst/>
+          </a:prstGeom>
+          <a:solidFill>
+            <a:srgbClr val="C00000"/>
+          </a:solidFill>
+          <a:ln>
+            <a:noFill/>
+          </a:ln>
+        </p:spPr>
+        <p:style>
+          <a:lnRef idx="2">
+            <a:schemeClr val="accent1">
+              <a:shade val="50000"/>
+            </a:schemeClr>
+          </a:lnRef>
+          <a:fillRef idx="1">
+            <a:schemeClr val="accent1"/>
+          </a:fillRef>
+          <a:effectRef idx="0">
+            <a:schemeClr val="accent1"/>
+          </a:effectRef>
+          <a:fontRef idx="minor">
+            <a:schemeClr val="lt1"/>
+          </a:fontRef>
+        </p:style>
+        <p:txBody>
+          <a:bodyPr rtlCol="0" anchor="ctr"/>
+          <a:lstStyle/>
+          <a:p>
+            <a:pPr algn="ctr"/>
+            <a:endParaRPr lang="de-DE"/>
+          </a:p>
+        </p:txBody>
+      </p:sp>
+      <p:sp>
+        <p:nvSpPr>
+          <p:cNvPr id="20" name="Rectangle 19"/>
+          <p:cNvSpPr/>
+          <p:nvPr/>
+        </p:nvSpPr>
+        <p:spPr>
+          <a:xfrm>
+            <a:off x="8527155" y="2536122"/>
+            <a:ext cx="151331" cy="467676"/>
+          </a:xfrm>
+          <a:prstGeom prst="rect">
+            <a:avLst/>
+          </a:prstGeom>
+          <a:solidFill>
+            <a:schemeClr val="accent3">
+              <a:lumMod val="75000"/>
+            </a:schemeClr>
+          </a:solidFill>
+          <a:ln>
+            <a:noFill/>
+          </a:ln>
+        </p:spPr>
+        <p:style>
+          <a:lnRef idx="2">
+            <a:schemeClr val="accent1">
+              <a:shade val="50000"/>
+            </a:schemeClr>
+          </a:lnRef>
+          <a:fillRef idx="1">
+            <a:schemeClr val="accent1"/>
+          </a:fillRef>
+          <a:effectRef idx="0">
+            <a:schemeClr val="accent1"/>
+          </a:effectRef>
+          <a:fontRef idx="minor">
+            <a:schemeClr val="lt1"/>
+          </a:fontRef>
+        </p:style>
+        <p:txBody>
+          <a:bodyPr rtlCol="0" anchor="ctr"/>
+          <a:lstStyle/>
+          <a:p>
+            <a:pPr algn="ctr"/>
+            <a:endParaRPr lang="de-DE"/>
+          </a:p>
+        </p:txBody>
+      </p:sp>
     </p:spTree>
     <p:extLst>
       <p:ext uri="{BB962C8B-B14F-4D97-AF65-F5344CB8AC3E}">
@@ -7277,7 +8151,7 @@
 </p:sld>
 </file>
 
-<file path=ppt/slides/slide4.xml><?xml version="1.0" encoding="utf-8"?>
+<file path=ppt/slides/slide5.xml><?xml version="1.0" encoding="utf-8"?>
 <p:sld xmlns:a="http://schemas.openxmlformats.org/drawingml/2006/main" xmlns:r="http://schemas.openxmlformats.org/officeDocument/2006/relationships" xmlns:p="http://schemas.openxmlformats.org/presentationml/2006/main">
   <p:cSld>
     <p:spTree>
@@ -8539,100 +9413,6 @@
       </p:graphicFrame>
       <p:sp>
         <p:nvSpPr>
-          <p:cNvPr id="3" name="Rectangle 2"/>
-          <p:cNvSpPr/>
-          <p:nvPr/>
-        </p:nvSpPr>
-        <p:spPr>
-          <a:xfrm>
-            <a:off x="8532440" y="1037637"/>
-            <a:ext cx="151331" cy="1508687"/>
-          </a:xfrm>
-          <a:prstGeom prst="rect">
-            <a:avLst/>
-          </a:prstGeom>
-          <a:solidFill>
-            <a:schemeClr val="accent3">
-              <a:lumMod val="75000"/>
-            </a:schemeClr>
-          </a:solidFill>
-          <a:ln>
-            <a:noFill/>
-          </a:ln>
-        </p:spPr>
-        <p:style>
-          <a:lnRef idx="2">
-            <a:schemeClr val="accent1">
-              <a:shade val="50000"/>
-            </a:schemeClr>
-          </a:lnRef>
-          <a:fillRef idx="1">
-            <a:schemeClr val="accent1"/>
-          </a:fillRef>
-          <a:effectRef idx="0">
-            <a:schemeClr val="accent1"/>
-          </a:effectRef>
-          <a:fontRef idx="minor">
-            <a:schemeClr val="lt1"/>
-          </a:fontRef>
-        </p:style>
-        <p:txBody>
-          <a:bodyPr rtlCol="0" anchor="ctr"/>
-          <a:lstStyle/>
-          <a:p>
-            <a:pPr algn="ctr"/>
-            <a:endParaRPr lang="de-DE"/>
-          </a:p>
-        </p:txBody>
-      </p:sp>
-      <p:sp>
-        <p:nvSpPr>
-          <p:cNvPr id="14" name="Rectangle 13"/>
-          <p:cNvSpPr/>
-          <p:nvPr/>
-        </p:nvSpPr>
-        <p:spPr>
-          <a:xfrm>
-            <a:off x="8533509" y="2633440"/>
-            <a:ext cx="150262" cy="384987"/>
-          </a:xfrm>
-          <a:prstGeom prst="rect">
-            <a:avLst/>
-          </a:prstGeom>
-          <a:solidFill>
-            <a:srgbClr val="C00000"/>
-          </a:solidFill>
-          <a:ln>
-            <a:noFill/>
-          </a:ln>
-        </p:spPr>
-        <p:style>
-          <a:lnRef idx="2">
-            <a:schemeClr val="accent1">
-              <a:shade val="50000"/>
-            </a:schemeClr>
-          </a:lnRef>
-          <a:fillRef idx="1">
-            <a:schemeClr val="accent1"/>
-          </a:fillRef>
-          <a:effectRef idx="0">
-            <a:schemeClr val="accent1"/>
-          </a:effectRef>
-          <a:fontRef idx="minor">
-            <a:schemeClr val="lt1"/>
-          </a:fontRef>
-        </p:style>
-        <p:txBody>
-          <a:bodyPr rtlCol="0" anchor="ctr"/>
-          <a:lstStyle/>
-          <a:p>
-            <a:pPr algn="ctr"/>
-            <a:endParaRPr lang="de-DE"/>
-          </a:p>
-        </p:txBody>
-      </p:sp>
-      <p:sp>
-        <p:nvSpPr>
           <p:cNvPr id="15" name="Left Arrow 14"/>
           <p:cNvSpPr/>
           <p:nvPr/>
@@ -9193,6 +9973,148 @@
           </a:p>
         </p:txBody>
       </p:sp>
+      <p:sp>
+        <p:nvSpPr>
+          <p:cNvPr id="22" name="Rectangle 21"/>
+          <p:cNvSpPr/>
+          <p:nvPr/>
+        </p:nvSpPr>
+        <p:spPr>
+          <a:xfrm>
+            <a:off x="8532440" y="1037637"/>
+            <a:ext cx="151331" cy="1102065"/>
+          </a:xfrm>
+          <a:prstGeom prst="rect">
+            <a:avLst/>
+          </a:prstGeom>
+          <a:solidFill>
+            <a:schemeClr val="accent3">
+              <a:lumMod val="75000"/>
+            </a:schemeClr>
+          </a:solidFill>
+          <a:ln>
+            <a:noFill/>
+          </a:ln>
+        </p:spPr>
+        <p:style>
+          <a:lnRef idx="2">
+            <a:schemeClr val="accent1">
+              <a:shade val="50000"/>
+            </a:schemeClr>
+          </a:lnRef>
+          <a:fillRef idx="1">
+            <a:schemeClr val="accent1"/>
+          </a:fillRef>
+          <a:effectRef idx="0">
+            <a:schemeClr val="accent1"/>
+          </a:effectRef>
+          <a:fontRef idx="minor">
+            <a:schemeClr val="lt1"/>
+          </a:fontRef>
+        </p:style>
+        <p:txBody>
+          <a:bodyPr rtlCol="0" anchor="ctr"/>
+          <a:lstStyle/>
+          <a:p>
+            <a:pPr algn="ctr"/>
+            <a:endParaRPr lang="de-DE"/>
+          </a:p>
+        </p:txBody>
+      </p:sp>
+      <p:sp>
+        <p:nvSpPr>
+          <p:cNvPr id="23" name="Rectangle 22"/>
+          <p:cNvSpPr/>
+          <p:nvPr/>
+        </p:nvSpPr>
+        <p:spPr>
+          <a:xfrm>
+            <a:off x="8533509" y="2163847"/>
+            <a:ext cx="150262" cy="349988"/>
+          </a:xfrm>
+          <a:prstGeom prst="rect">
+            <a:avLst/>
+          </a:prstGeom>
+          <a:solidFill>
+            <a:srgbClr val="C00000"/>
+          </a:solidFill>
+          <a:ln>
+            <a:noFill/>
+          </a:ln>
+        </p:spPr>
+        <p:style>
+          <a:lnRef idx="2">
+            <a:schemeClr val="accent1">
+              <a:shade val="50000"/>
+            </a:schemeClr>
+          </a:lnRef>
+          <a:fillRef idx="1">
+            <a:schemeClr val="accent1"/>
+          </a:fillRef>
+          <a:effectRef idx="0">
+            <a:schemeClr val="accent1"/>
+          </a:effectRef>
+          <a:fontRef idx="minor">
+            <a:schemeClr val="lt1"/>
+          </a:fontRef>
+        </p:style>
+        <p:txBody>
+          <a:bodyPr rtlCol="0" anchor="ctr"/>
+          <a:lstStyle/>
+          <a:p>
+            <a:pPr algn="ctr"/>
+            <a:endParaRPr lang="de-DE"/>
+          </a:p>
+        </p:txBody>
+      </p:sp>
+      <p:sp>
+        <p:nvSpPr>
+          <p:cNvPr id="24" name="Rectangle 23"/>
+          <p:cNvSpPr/>
+          <p:nvPr/>
+        </p:nvSpPr>
+        <p:spPr>
+          <a:xfrm>
+            <a:off x="8527155" y="2536122"/>
+            <a:ext cx="151331" cy="467676"/>
+          </a:xfrm>
+          <a:prstGeom prst="rect">
+            <a:avLst/>
+          </a:prstGeom>
+          <a:solidFill>
+            <a:schemeClr val="accent3">
+              <a:lumMod val="75000"/>
+            </a:schemeClr>
+          </a:solidFill>
+          <a:ln>
+            <a:noFill/>
+          </a:ln>
+        </p:spPr>
+        <p:style>
+          <a:lnRef idx="2">
+            <a:schemeClr val="accent1">
+              <a:shade val="50000"/>
+            </a:schemeClr>
+          </a:lnRef>
+          <a:fillRef idx="1">
+            <a:schemeClr val="accent1"/>
+          </a:fillRef>
+          <a:effectRef idx="0">
+            <a:schemeClr val="accent1"/>
+          </a:effectRef>
+          <a:fontRef idx="minor">
+            <a:schemeClr val="lt1"/>
+          </a:fontRef>
+        </p:style>
+        <p:txBody>
+          <a:bodyPr rtlCol="0" anchor="ctr"/>
+          <a:lstStyle/>
+          <a:p>
+            <a:pPr algn="ctr"/>
+            <a:endParaRPr lang="de-DE"/>
+          </a:p>
+        </p:txBody>
+      </p:sp>
     </p:spTree>
     <p:extLst>
       <p:ext uri="{BB962C8B-B14F-4D97-AF65-F5344CB8AC3E}">
@@ -9206,7 +10128,7 @@
 </p:sld>
 </file>
 
-<file path=ppt/slides/slide5.xml><?xml version="1.0" encoding="utf-8"?>
+<file path=ppt/slides/slide6.xml><?xml version="1.0" encoding="utf-8"?>
 <p:sld xmlns:a="http://schemas.openxmlformats.org/drawingml/2006/main" xmlns:r="http://schemas.openxmlformats.org/officeDocument/2006/relationships" xmlns:p="http://schemas.openxmlformats.org/presentationml/2006/main">
   <p:cSld>
     <p:spTree>
@@ -9834,16 +10756,36 @@
               <a:t>            </a:t>
             </a:r>
             <a:r>
+              <a:rPr lang="en-US" sz="1400" dirty="0" smtClean="0"/>
+              <a:t>“</a:t>
+            </a:r>
+            <a:r>
               <a:rPr lang="en-US" sz="1400" dirty="0" smtClean="0">
                 <a:solidFill>
-                  <a:srgbClr val="FF0000"/>
-                </a:solidFill>
-              </a:rPr>
-              <a:t>“ORDER BY value LIMIT 100“</a:t>
+                  <a:schemeClr val="accent4">
+                    <a:lumMod val="75000"/>
+                  </a:schemeClr>
+                </a:solidFill>
+              </a:rPr>
+              <a:t>ORDER BY</a:t>
             </a:r>
             <a:r>
               <a:rPr lang="en-US" sz="1400" dirty="0" smtClean="0"/>
-              <a:t>, </a:t>
+              <a:t> value </a:t>
+            </a:r>
+            <a:r>
+              <a:rPr lang="en-US" sz="1400" dirty="0" smtClean="0">
+                <a:solidFill>
+                  <a:schemeClr val="accent4">
+                    <a:lumMod val="75000"/>
+                  </a:schemeClr>
+                </a:solidFill>
+              </a:rPr>
+              <a:t>LIMIT</a:t>
+            </a:r>
+            <a:r>
+              <a:rPr lang="en-US" sz="1400" dirty="0" smtClean="0"/>
+              <a:t> 100“, </a:t>
             </a:r>
             <a:r>
               <a:rPr lang="de-DE" sz="1400" dirty="0" err="1" smtClean="0">
@@ -10225,100 +11167,6 @@
       </p:pic>
       <p:sp>
         <p:nvSpPr>
-          <p:cNvPr id="3" name="Rectangle 2"/>
-          <p:cNvSpPr/>
-          <p:nvPr/>
-        </p:nvSpPr>
-        <p:spPr>
-          <a:xfrm>
-            <a:off x="8532440" y="1037637"/>
-            <a:ext cx="151331" cy="1102065"/>
-          </a:xfrm>
-          <a:prstGeom prst="rect">
-            <a:avLst/>
-          </a:prstGeom>
-          <a:solidFill>
-            <a:schemeClr val="accent3">
-              <a:lumMod val="75000"/>
-            </a:schemeClr>
-          </a:solidFill>
-          <a:ln>
-            <a:noFill/>
-          </a:ln>
-        </p:spPr>
-        <p:style>
-          <a:lnRef idx="2">
-            <a:schemeClr val="accent1">
-              <a:shade val="50000"/>
-            </a:schemeClr>
-          </a:lnRef>
-          <a:fillRef idx="1">
-            <a:schemeClr val="accent1"/>
-          </a:fillRef>
-          <a:effectRef idx="0">
-            <a:schemeClr val="accent1"/>
-          </a:effectRef>
-          <a:fontRef idx="minor">
-            <a:schemeClr val="lt1"/>
-          </a:fontRef>
-        </p:style>
-        <p:txBody>
-          <a:bodyPr rtlCol="0" anchor="ctr"/>
-          <a:lstStyle/>
-          <a:p>
-            <a:pPr algn="ctr"/>
-            <a:endParaRPr lang="de-DE"/>
-          </a:p>
-        </p:txBody>
-      </p:sp>
-      <p:sp>
-        <p:nvSpPr>
-          <p:cNvPr id="14" name="Rectangle 13"/>
-          <p:cNvSpPr/>
-          <p:nvPr/>
-        </p:nvSpPr>
-        <p:spPr>
-          <a:xfrm>
-            <a:off x="8533509" y="2163847"/>
-            <a:ext cx="150262" cy="349988"/>
-          </a:xfrm>
-          <a:prstGeom prst="rect">
-            <a:avLst/>
-          </a:prstGeom>
-          <a:solidFill>
-            <a:srgbClr val="C00000"/>
-          </a:solidFill>
-          <a:ln>
-            <a:noFill/>
-          </a:ln>
-        </p:spPr>
-        <p:style>
-          <a:lnRef idx="2">
-            <a:schemeClr val="accent1">
-              <a:shade val="50000"/>
-            </a:schemeClr>
-          </a:lnRef>
-          <a:fillRef idx="1">
-            <a:schemeClr val="accent1"/>
-          </a:fillRef>
-          <a:effectRef idx="0">
-            <a:schemeClr val="accent1"/>
-          </a:effectRef>
-          <a:fontRef idx="minor">
-            <a:schemeClr val="lt1"/>
-          </a:fontRef>
-        </p:style>
-        <p:txBody>
-          <a:bodyPr rtlCol="0" anchor="ctr"/>
-          <a:lstStyle/>
-          <a:p>
-            <a:pPr algn="ctr"/>
-            <a:endParaRPr lang="de-DE"/>
-          </a:p>
-        </p:txBody>
-      </p:sp>
-      <p:sp>
-        <p:nvSpPr>
           <p:cNvPr id="23" name="Rectangle 22"/>
           <p:cNvSpPr/>
           <p:nvPr/>
@@ -10332,7 +11180,7 @@
             <a:avLst/>
           </a:prstGeom>
           <a:solidFill>
-            <a:srgbClr val="17375E">
+            <a:srgbClr val="FF0000">
               <a:alpha val="54902"/>
             </a:srgbClr>
           </a:solidFill>
@@ -10847,14 +11695,14 @@
       </p:graphicFrame>
       <p:sp>
         <p:nvSpPr>
-          <p:cNvPr id="27" name="Rectangle 26"/>
+          <p:cNvPr id="28" name="Rectangle 27"/>
           <p:cNvSpPr/>
           <p:nvPr/>
         </p:nvSpPr>
         <p:spPr>
           <a:xfrm>
-            <a:off x="8527155" y="2536122"/>
-            <a:ext cx="151331" cy="467676"/>
+            <a:off x="8532440" y="1037637"/>
+            <a:ext cx="151331" cy="1508687"/>
           </a:xfrm>
           <a:prstGeom prst="rect">
             <a:avLst/>
@@ -10893,1739 +11741,56 @@
           </a:p>
         </p:txBody>
       </p:sp>
-    </p:spTree>
-    <p:extLst>
-      <p:ext uri="{BB962C8B-B14F-4D97-AF65-F5344CB8AC3E}">
-        <p14:creationId xmlns:p14="http://schemas.microsoft.com/office/powerpoint/2010/main" val="3253654236"/>
-      </p:ext>
-    </p:extLst>
-  </p:cSld>
-  <p:clrMapOvr>
-    <a:masterClrMapping/>
-  </p:clrMapOvr>
-</p:sld>
-</file>
-
-<file path=ppt/slides/slide6.xml><?xml version="1.0" encoding="utf-8"?>
-<p:sld xmlns:a="http://schemas.openxmlformats.org/drawingml/2006/main" xmlns:r="http://schemas.openxmlformats.org/officeDocument/2006/relationships" xmlns:p="http://schemas.openxmlformats.org/presentationml/2006/main">
-  <p:cSld>
-    <p:spTree>
-      <p:nvGrpSpPr>
-        <p:cNvPr id="1" name=""/>
-        <p:cNvGrpSpPr/>
-        <p:nvPr/>
-      </p:nvGrpSpPr>
-      <p:grpSpPr>
-        <a:xfrm>
-          <a:off x="0" y="0"/>
-          <a:ext cx="0" cy="0"/>
-          <a:chOff x="0" y="0"/>
-          <a:chExt cx="0" cy="0"/>
-        </a:xfrm>
-      </p:grpSpPr>
-      <p:grpSp>
-        <p:nvGrpSpPr>
-          <p:cNvPr id="8" name="Group 7"/>
-          <p:cNvGrpSpPr/>
-          <p:nvPr/>
-        </p:nvGrpSpPr>
-        <p:grpSpPr>
-          <a:xfrm>
-            <a:off x="0" y="72009"/>
-            <a:ext cx="9144000" cy="4953295"/>
-            <a:chOff x="0" y="72009"/>
-            <a:chExt cx="9144000" cy="4953295"/>
-          </a:xfrm>
-        </p:grpSpPr>
-        <p:grpSp>
-          <p:nvGrpSpPr>
-            <p:cNvPr id="6" name="Group 5"/>
-            <p:cNvGrpSpPr/>
-            <p:nvPr/>
-          </p:nvGrpSpPr>
-          <p:grpSpPr>
-            <a:xfrm>
-              <a:off x="0" y="72009"/>
-              <a:ext cx="9144000" cy="4953295"/>
-              <a:chOff x="0" y="72009"/>
-              <a:chExt cx="9144000" cy="4953295"/>
-            </a:xfrm>
-          </p:grpSpPr>
-          <p:pic>
-            <p:nvPicPr>
-              <p:cNvPr id="1031" name="Picture 7"/>
-              <p:cNvPicPr>
-                <a:picLocks noChangeAspect="1" noChangeArrowheads="1"/>
-              </p:cNvPicPr>
-              <p:nvPr/>
-            </p:nvPicPr>
-            <p:blipFill>
-              <a:blip r:embed="rId2">
-                <a:extLst>
-                  <a:ext uri="{28A0092B-C50C-407E-A947-70E740481C1C}">
-                    <a14:useLocalDpi xmlns:a14="http://schemas.microsoft.com/office/drawing/2010/main" val="0"/>
-                  </a:ext>
-                </a:extLst>
-              </a:blip>
-              <a:srcRect/>
-              <a:stretch>
-                <a:fillRect/>
-              </a:stretch>
-            </p:blipFill>
-            <p:spPr bwMode="auto">
-              <a:xfrm>
-                <a:off x="0" y="72009"/>
-                <a:ext cx="9144000" cy="4953295"/>
-              </a:xfrm>
-              <a:prstGeom prst="rect">
-                <a:avLst/>
-              </a:prstGeom>
-              <a:noFill/>
-              <a:ln>
-                <a:noFill/>
-              </a:ln>
-              <a:effectLst/>
-              <a:extLst>
-                <a:ext uri="{909E8E84-426E-40DD-AFC4-6F175D3DCCD1}">
-                  <a14:hiddenFill xmlns:a14="http://schemas.microsoft.com/office/drawing/2010/main">
-                    <a:solidFill>
-                      <a:schemeClr val="accent1"/>
-                    </a:solidFill>
-                  </a14:hiddenFill>
-                </a:ext>
-                <a:ext uri="{91240B29-F687-4F45-9708-019B960494DF}">
-                  <a14:hiddenLine xmlns:a14="http://schemas.microsoft.com/office/drawing/2010/main" w="9525">
-                    <a:solidFill>
-                      <a:schemeClr val="tx1"/>
-                    </a:solidFill>
-                    <a:miter lim="800000"/>
-                    <a:headEnd/>
-                    <a:tailEnd/>
-                  </a14:hiddenLine>
-                </a:ext>
-                <a:ext uri="{AF507438-7753-43E0-B8FC-AC1667EBCBE1}">
-                  <a14:hiddenEffects xmlns:a14="http://schemas.microsoft.com/office/drawing/2010/main">
-                    <a:effectLst>
-                      <a:outerShdw dist="35921" dir="2700000" algn="ctr" rotWithShape="0">
-                        <a:schemeClr val="bg2"/>
-                      </a:outerShdw>
-                    </a:effectLst>
-                  </a14:hiddenEffects>
-                </a:ext>
-              </a:extLst>
-            </p:spPr>
-          </p:pic>
-          <p:sp>
-            <p:nvSpPr>
-              <p:cNvPr id="5" name="Rounded Rectangle 4"/>
-              <p:cNvSpPr/>
-              <p:nvPr/>
-            </p:nvSpPr>
-            <p:spPr>
-              <a:xfrm>
-                <a:off x="2370528" y="3501504"/>
-                <a:ext cx="6590828" cy="1404000"/>
-              </a:xfrm>
-              <a:prstGeom prst="roundRect">
-                <a:avLst>
-                  <a:gd name="adj" fmla="val 2673"/>
-                </a:avLst>
-              </a:prstGeom>
-              <a:solidFill>
-                <a:schemeClr val="bg1"/>
-              </a:solidFill>
-              <a:ln>
-                <a:noFill/>
-              </a:ln>
-            </p:spPr>
-            <p:style>
-              <a:lnRef idx="2">
-                <a:schemeClr val="accent1">
-                  <a:shade val="50000"/>
-                </a:schemeClr>
-              </a:lnRef>
-              <a:fillRef idx="1">
-                <a:schemeClr val="accent1"/>
-              </a:fillRef>
-              <a:effectRef idx="0">
-                <a:schemeClr val="accent1"/>
-              </a:effectRef>
-              <a:fontRef idx="minor">
-                <a:schemeClr val="lt1"/>
-              </a:fontRef>
-            </p:style>
-            <p:txBody>
-              <a:bodyPr rtlCol="0" anchor="ctr"/>
-              <a:lstStyle/>
-              <a:p>
-                <a:pPr algn="ctr"/>
-                <a:endParaRPr lang="de-DE"/>
-              </a:p>
-            </p:txBody>
-          </p:sp>
-          <p:sp>
-            <p:nvSpPr>
-              <p:cNvPr id="12" name="Rounded Rectangle 11"/>
-              <p:cNvSpPr/>
-              <p:nvPr/>
-            </p:nvSpPr>
-            <p:spPr>
-              <a:xfrm>
-                <a:off x="22340" y="2561584"/>
-                <a:ext cx="2293200" cy="2347200"/>
-              </a:xfrm>
-              <a:prstGeom prst="roundRect">
-                <a:avLst>
-                  <a:gd name="adj" fmla="val 1368"/>
-                </a:avLst>
-              </a:prstGeom>
-              <a:solidFill>
-                <a:schemeClr val="bg1"/>
-              </a:solidFill>
-              <a:ln>
-                <a:noFill/>
-              </a:ln>
-            </p:spPr>
-            <p:style>
-              <a:lnRef idx="2">
-                <a:schemeClr val="accent1">
-                  <a:shade val="50000"/>
-                </a:schemeClr>
-              </a:lnRef>
-              <a:fillRef idx="1">
-                <a:schemeClr val="accent1"/>
-              </a:fillRef>
-              <a:effectRef idx="0">
-                <a:schemeClr val="accent1"/>
-              </a:effectRef>
-              <a:fontRef idx="minor">
-                <a:schemeClr val="lt1"/>
-              </a:fontRef>
-            </p:style>
-            <p:txBody>
-              <a:bodyPr rtlCol="0" anchor="ctr"/>
-              <a:lstStyle/>
-              <a:p>
-                <a:pPr algn="ctr"/>
-                <a:endParaRPr lang="de-DE"/>
-              </a:p>
-            </p:txBody>
-          </p:sp>
-        </p:grpSp>
-        <p:sp>
-          <p:nvSpPr>
-            <p:cNvPr id="7" name="TextBox 6"/>
-            <p:cNvSpPr txBox="1"/>
-            <p:nvPr/>
-          </p:nvSpPr>
-          <p:spPr>
-            <a:xfrm>
-              <a:off x="2483768" y="593626"/>
-              <a:ext cx="6300000" cy="2677656"/>
-            </a:xfrm>
-            <a:prstGeom prst="rect">
-              <a:avLst/>
-            </a:prstGeom>
-            <a:solidFill>
-              <a:schemeClr val="bg1"/>
-            </a:solidFill>
-          </p:spPr>
-          <p:txBody>
-            <a:bodyPr wrap="square" rtlCol="0">
-              <a:spAutoFit/>
-            </a:bodyPr>
-            <a:lstStyle/>
-            <a:p>
-              <a:r>
-                <a:rPr lang="en-US" sz="1400" dirty="0" smtClean="0">
-                  <a:solidFill>
-                    <a:schemeClr val="accent2">
-                      <a:lumMod val="75000"/>
-                    </a:schemeClr>
-                  </a:solidFill>
-                </a:rPr>
-                <a:t>public </a:t>
-              </a:r>
-              <a:r>
-                <a:rPr lang="en-US" sz="1400" dirty="0">
-                  <a:solidFill>
-                    <a:schemeClr val="accent2">
-                      <a:lumMod val="75000"/>
-                    </a:schemeClr>
-                  </a:solidFill>
-                </a:rPr>
-                <a:t>class</a:t>
-              </a:r>
-              <a:r>
-                <a:rPr lang="en-US" sz="1400" dirty="0"/>
-                <a:t> </a:t>
-              </a:r>
-              <a:r>
-                <a:rPr lang="en-US" sz="1400" dirty="0" err="1">
-                  <a:solidFill>
-                    <a:schemeClr val="tx2"/>
-                  </a:solidFill>
-                </a:rPr>
-                <a:t>SampleQueryClass</a:t>
-              </a:r>
-              <a:r>
-                <a:rPr lang="en-US" sz="1400" dirty="0"/>
-                <a:t> </a:t>
-              </a:r>
-              <a:r>
-                <a:rPr lang="en-US" sz="1400" dirty="0">
-                  <a:solidFill>
-                    <a:schemeClr val="accent2">
-                      <a:lumMod val="75000"/>
-                    </a:schemeClr>
-                  </a:solidFill>
-                </a:rPr>
-                <a:t>extends</a:t>
-              </a:r>
-              <a:r>
-                <a:rPr lang="en-US" sz="1400" dirty="0"/>
-                <a:t> </a:t>
-              </a:r>
-              <a:r>
-                <a:rPr lang="en-US" sz="1400" dirty="0" err="1">
-                  <a:solidFill>
-                    <a:schemeClr val="tx2"/>
-                  </a:solidFill>
-                </a:rPr>
-                <a:t>DbQuery</a:t>
-              </a:r>
-              <a:r>
-                <a:rPr lang="en-US" sz="1400" dirty="0"/>
-                <a:t>{</a:t>
-              </a:r>
-            </a:p>
-            <a:p>
-              <a:r>
-                <a:rPr lang="de-DE" sz="1400" dirty="0"/>
-                <a:t> </a:t>
-              </a:r>
-              <a:r>
-                <a:rPr lang="de-DE" sz="1400" dirty="0" smtClean="0"/>
-                <a:t>   </a:t>
-              </a:r>
-              <a:r>
-                <a:rPr lang="de-DE" sz="1400" dirty="0" err="1" smtClean="0">
-                  <a:solidFill>
-                    <a:schemeClr val="accent2">
-                      <a:lumMod val="75000"/>
-                    </a:schemeClr>
-                  </a:solidFill>
-                </a:rPr>
-                <a:t>protected</a:t>
-              </a:r>
-              <a:r>
-                <a:rPr lang="de-DE" sz="1400" dirty="0" smtClean="0">
-                  <a:solidFill>
-                    <a:schemeClr val="accent2">
-                      <a:lumMod val="75000"/>
-                    </a:schemeClr>
-                  </a:solidFill>
-                </a:rPr>
-                <a:t> </a:t>
-              </a:r>
-              <a:r>
-                <a:rPr lang="de-DE" sz="1400" dirty="0">
-                  <a:solidFill>
-                    <a:schemeClr val="tx2"/>
-                  </a:solidFill>
-                </a:rPr>
-                <a:t>List</a:t>
-              </a:r>
-              <a:r>
-                <a:rPr lang="de-DE" sz="1400" dirty="0"/>
-                <a:t>&lt;</a:t>
-              </a:r>
-              <a:r>
-                <a:rPr lang="de-DE" sz="1400" dirty="0">
-                  <a:solidFill>
-                    <a:schemeClr val="tx2"/>
-                  </a:solidFill>
-                </a:rPr>
-                <a:t>String</a:t>
-              </a:r>
-              <a:r>
-                <a:rPr lang="de-DE" sz="1400" dirty="0"/>
-                <a:t>&gt; </a:t>
-              </a:r>
-              <a:r>
-                <a:rPr lang="de-DE" sz="1400" dirty="0" err="1"/>
-                <a:t>showMostSoldProducts</a:t>
-              </a:r>
-              <a:r>
-                <a:rPr lang="de-DE" sz="1400" dirty="0"/>
-                <a:t>(</a:t>
-              </a:r>
-              <a:r>
-                <a:rPr lang="de-DE" sz="1400" dirty="0">
-                  <a:solidFill>
-                    <a:schemeClr val="tx2"/>
-                  </a:solidFill>
-                </a:rPr>
-                <a:t>Integer</a:t>
-              </a:r>
-              <a:r>
-                <a:rPr lang="de-DE" sz="1400" dirty="0"/>
-                <a:t> </a:t>
-              </a:r>
-              <a:r>
-                <a:rPr lang="de-DE" sz="1400" dirty="0" err="1">
-                  <a:solidFill>
-                    <a:schemeClr val="accent3">
-                      <a:lumMod val="75000"/>
-                    </a:schemeClr>
-                  </a:solidFill>
-                </a:rPr>
-                <a:t>year</a:t>
-              </a:r>
-              <a:r>
-                <a:rPr lang="de-DE" sz="1400" dirty="0" smtClean="0"/>
-                <a:t>){</a:t>
-              </a:r>
-            </a:p>
-            <a:p>
-              <a:r>
-                <a:rPr lang="de-DE" sz="1400" dirty="0" smtClean="0">
-                  <a:solidFill>
-                    <a:schemeClr val="tx2"/>
-                  </a:solidFill>
-                </a:rPr>
-                <a:t>        List</a:t>
-              </a:r>
-              <a:r>
-                <a:rPr lang="de-DE" sz="1400" dirty="0" smtClean="0"/>
-                <a:t>&lt;</a:t>
-              </a:r>
-              <a:r>
-                <a:rPr lang="de-DE" sz="1400" dirty="0" smtClean="0">
-                  <a:solidFill>
-                    <a:schemeClr val="tx2"/>
-                  </a:solidFill>
-                </a:rPr>
-                <a:t>String</a:t>
-              </a:r>
-              <a:r>
-                <a:rPr lang="de-DE" sz="1400" dirty="0"/>
-                <a:t>&gt; </a:t>
-              </a:r>
-              <a:r>
-                <a:rPr lang="de-DE" sz="1400" dirty="0" err="1">
-                  <a:solidFill>
-                    <a:schemeClr val="accent3">
-                      <a:lumMod val="75000"/>
-                    </a:schemeClr>
-                  </a:solidFill>
-                </a:rPr>
-                <a:t>result</a:t>
-              </a:r>
-              <a:r>
-                <a:rPr lang="de-DE" sz="1400" dirty="0"/>
-                <a:t> = </a:t>
-              </a:r>
-              <a:r>
-                <a:rPr lang="de-DE" sz="1400" dirty="0" err="1">
-                  <a:solidFill>
-                    <a:schemeClr val="accent2">
-                      <a:lumMod val="75000"/>
-                    </a:schemeClr>
-                  </a:solidFill>
-                </a:rPr>
-                <a:t>this</a:t>
-              </a:r>
-              <a:r>
-                <a:rPr lang="de-DE" sz="1400" dirty="0" err="1"/>
-                <a:t>.</a:t>
-              </a:r>
-              <a:r>
-                <a:rPr lang="de-DE" sz="1400" dirty="0" err="1">
-                  <a:solidFill>
-                    <a:schemeClr val="bg1">
-                      <a:lumMod val="50000"/>
-                    </a:schemeClr>
-                  </a:solidFill>
-                </a:rPr>
-                <a:t>execute</a:t>
-              </a:r>
-              <a:r>
-                <a:rPr lang="de-DE" sz="1400" dirty="0"/>
-                <a:t>(</a:t>
-              </a:r>
-            </a:p>
-            <a:p>
-              <a:r>
-                <a:rPr lang="en-US" sz="1400" dirty="0" smtClean="0"/>
-                <a:t>            "</a:t>
-              </a:r>
-              <a:r>
-                <a:rPr lang="en-US" sz="1400" dirty="0">
-                  <a:solidFill>
-                    <a:schemeClr val="accent4">
-                      <a:lumMod val="75000"/>
-                    </a:schemeClr>
-                  </a:solidFill>
-                </a:rPr>
-                <a:t>SELECT</a:t>
-              </a:r>
-              <a:r>
-                <a:rPr lang="en-US" sz="1400" dirty="0"/>
-                <a:t> product, sum(value) </a:t>
-              </a:r>
-              <a:r>
-                <a:rPr lang="en-US" sz="1400" dirty="0">
-                  <a:solidFill>
-                    <a:schemeClr val="accent4">
-                      <a:lumMod val="75000"/>
-                    </a:schemeClr>
-                  </a:solidFill>
-                </a:rPr>
-                <a:t>AS</a:t>
-              </a:r>
-              <a:r>
-                <a:rPr lang="en-US" sz="1400" dirty="0"/>
-                <a:t> value </a:t>
-              </a:r>
-              <a:r>
-                <a:rPr lang="en-US" sz="1400" dirty="0">
-                  <a:solidFill>
-                    <a:schemeClr val="accent4">
-                      <a:lumMod val="75000"/>
-                    </a:schemeClr>
-                  </a:solidFill>
-                </a:rPr>
-                <a:t>FROM</a:t>
-              </a:r>
-              <a:r>
-                <a:rPr lang="en-US" sz="1400" dirty="0"/>
-                <a:t>" +</a:t>
-              </a:r>
-            </a:p>
-            <a:p>
-              <a:r>
-                <a:rPr lang="en-US" sz="1400" dirty="0" smtClean="0"/>
-                <a:t>            "</a:t>
-              </a:r>
-              <a:r>
-                <a:rPr lang="en-US" sz="1400" dirty="0"/>
-                <a:t>orders </a:t>
-              </a:r>
-              <a:r>
-                <a:rPr lang="en-US" sz="1400" dirty="0">
-                  <a:solidFill>
-                    <a:schemeClr val="accent4">
-                      <a:lumMod val="75000"/>
-                    </a:schemeClr>
-                  </a:solidFill>
-                </a:rPr>
-                <a:t>JOIN</a:t>
-              </a:r>
-              <a:r>
-                <a:rPr lang="en-US" sz="1400" dirty="0"/>
-                <a:t> products </a:t>
-              </a:r>
-              <a:r>
-                <a:rPr lang="en-US" sz="1400" dirty="0">
-                  <a:solidFill>
-                    <a:schemeClr val="accent4">
-                      <a:lumMod val="75000"/>
-                    </a:schemeClr>
-                  </a:solidFill>
-                </a:rPr>
-                <a:t>ON</a:t>
-              </a:r>
-              <a:r>
-                <a:rPr lang="en-US" sz="1400" dirty="0"/>
-                <a:t> </a:t>
-              </a:r>
-              <a:r>
-                <a:rPr lang="en-US" sz="1400" dirty="0" err="1"/>
-                <a:t>orders.pid</a:t>
-              </a:r>
-              <a:r>
-                <a:rPr lang="en-US" sz="1400" dirty="0"/>
-                <a:t> = </a:t>
-              </a:r>
-              <a:r>
-                <a:rPr lang="en-US" sz="1400" dirty="0" err="1"/>
-                <a:t>products.pid</a:t>
-              </a:r>
-              <a:r>
-                <a:rPr lang="en-US" sz="1400" dirty="0"/>
-                <a:t>" +</a:t>
-              </a:r>
-            </a:p>
-            <a:p>
-              <a:r>
-                <a:rPr lang="en-US" sz="1400" dirty="0" smtClean="0"/>
-                <a:t>            "</a:t>
-              </a:r>
-              <a:r>
-                <a:rPr lang="en-US" sz="1400" dirty="0">
-                  <a:solidFill>
-                    <a:schemeClr val="accent4">
-                      <a:lumMod val="75000"/>
-                    </a:schemeClr>
-                  </a:solidFill>
-                </a:rPr>
-                <a:t>WHERE</a:t>
-              </a:r>
-              <a:r>
-                <a:rPr lang="en-US" sz="1400" dirty="0"/>
-                <a:t> year=%d </a:t>
-              </a:r>
-              <a:r>
-                <a:rPr lang="en-US" sz="1400" dirty="0">
-                  <a:solidFill>
-                    <a:schemeClr val="accent4">
-                      <a:lumMod val="75000"/>
-                    </a:schemeClr>
-                  </a:solidFill>
-                </a:rPr>
-                <a:t>AND</a:t>
-              </a:r>
-              <a:r>
-                <a:rPr lang="en-US" sz="1400" dirty="0"/>
-                <a:t> company=%s </a:t>
-              </a:r>
-              <a:r>
-                <a:rPr lang="en-US" sz="1400" dirty="0">
-                  <a:solidFill>
-                    <a:schemeClr val="accent4">
-                      <a:lumMod val="75000"/>
-                    </a:schemeClr>
-                  </a:solidFill>
-                </a:rPr>
-                <a:t>GROUP BY</a:t>
-              </a:r>
-              <a:r>
-                <a:rPr lang="en-US" sz="1400" dirty="0"/>
-                <a:t> product</a:t>
-              </a:r>
-              <a:r>
-                <a:rPr lang="en-US" sz="1400" dirty="0" smtClean="0"/>
-                <a:t>"</a:t>
-              </a:r>
-              <a:r>
-                <a:rPr lang="de-DE" sz="1400" dirty="0" smtClean="0"/>
-                <a:t>,</a:t>
-              </a:r>
-            </a:p>
-            <a:p>
-              <a:r>
-                <a:rPr lang="de-DE" sz="1400" dirty="0" smtClean="0"/>
-                <a:t>            </a:t>
-              </a:r>
-              <a:r>
-                <a:rPr lang="de-DE" sz="1400" dirty="0" err="1" smtClean="0">
-                  <a:solidFill>
-                    <a:schemeClr val="accent3">
-                      <a:lumMod val="75000"/>
-                    </a:schemeClr>
-                  </a:solidFill>
-                </a:rPr>
-                <a:t>year</a:t>
-              </a:r>
-              <a:r>
-                <a:rPr lang="de-DE" sz="1400" dirty="0"/>
-                <a:t>, </a:t>
-              </a:r>
-              <a:r>
-                <a:rPr lang="de-DE" sz="1400" dirty="0" err="1" smtClean="0">
-                  <a:solidFill>
-                    <a:schemeClr val="tx2"/>
-                  </a:solidFill>
-                </a:rPr>
-                <a:t>Settings</a:t>
-              </a:r>
-              <a:r>
-                <a:rPr lang="de-DE" sz="1400" dirty="0" err="1" smtClean="0"/>
-                <a:t>.</a:t>
-              </a:r>
-              <a:r>
-                <a:rPr lang="de-DE" sz="1400" dirty="0" err="1" smtClean="0">
-                  <a:solidFill>
-                    <a:schemeClr val="accent3">
-                      <a:lumMod val="75000"/>
-                    </a:schemeClr>
-                  </a:solidFill>
-                </a:rPr>
-                <a:t>company</a:t>
-              </a:r>
-              <a:r>
-                <a:rPr lang="de-DE" sz="1400" dirty="0" smtClean="0"/>
-                <a:t>);</a:t>
-              </a:r>
-              <a:endParaRPr lang="de-DE" sz="1400" dirty="0"/>
-            </a:p>
-            <a:p>
-              <a:r>
-                <a:rPr lang="de-DE" sz="1400" dirty="0" smtClean="0"/>
-                <a:t>        </a:t>
-              </a:r>
-              <a:r>
-                <a:rPr lang="de-DE" sz="1400" dirty="0" err="1" smtClean="0">
-                  <a:solidFill>
-                    <a:schemeClr val="accent2">
-                      <a:lumMod val="75000"/>
-                    </a:schemeClr>
-                  </a:solidFill>
-                </a:rPr>
-                <a:t>if</a:t>
-              </a:r>
-              <a:r>
-                <a:rPr lang="de-DE" sz="1400" dirty="0" smtClean="0"/>
-                <a:t>(</a:t>
-              </a:r>
-              <a:r>
-                <a:rPr lang="de-DE" sz="1400" dirty="0" err="1" smtClean="0">
-                  <a:solidFill>
-                    <a:schemeClr val="accent3">
-                      <a:lumMod val="75000"/>
-                    </a:schemeClr>
-                  </a:solidFill>
-                </a:rPr>
-                <a:t>result</a:t>
-              </a:r>
-              <a:r>
-                <a:rPr lang="de-DE" sz="1400" dirty="0" err="1" smtClean="0"/>
-                <a:t>.</a:t>
-              </a:r>
-              <a:r>
-                <a:rPr lang="de-DE" sz="1400" dirty="0" err="1" smtClean="0">
-                  <a:solidFill>
-                    <a:schemeClr val="bg1">
-                      <a:lumMod val="50000"/>
-                    </a:schemeClr>
-                  </a:solidFill>
-                </a:rPr>
-                <a:t>size</a:t>
-              </a:r>
-              <a:r>
-                <a:rPr lang="de-DE" sz="1400" dirty="0"/>
-                <a:t>() == 0){</a:t>
-              </a:r>
-            </a:p>
-            <a:p>
-              <a:r>
-                <a:rPr lang="en-US" sz="1400" dirty="0" smtClean="0"/>
-                <a:t>            </a:t>
-              </a:r>
-              <a:r>
-                <a:rPr lang="en-US" sz="1400" dirty="0" smtClean="0">
-                  <a:solidFill>
-                    <a:schemeClr val="accent2">
-                      <a:lumMod val="75000"/>
-                    </a:schemeClr>
-                  </a:solidFill>
-                </a:rPr>
-                <a:t>throw </a:t>
-              </a:r>
-              <a:r>
-                <a:rPr lang="en-US" sz="1400" dirty="0">
-                  <a:solidFill>
-                    <a:schemeClr val="accent2">
-                      <a:lumMod val="75000"/>
-                    </a:schemeClr>
-                  </a:solidFill>
-                </a:rPr>
-                <a:t>new</a:t>
-              </a:r>
-              <a:r>
-                <a:rPr lang="en-US" sz="1400" dirty="0"/>
-                <a:t> </a:t>
-              </a:r>
-              <a:r>
-                <a:rPr lang="en-US" sz="1400" dirty="0" err="1">
-                  <a:solidFill>
-                    <a:schemeClr val="tx2"/>
-                  </a:solidFill>
-                </a:rPr>
-                <a:t>RuntimeException</a:t>
-              </a:r>
-              <a:r>
-                <a:rPr lang="en-US" sz="1400" dirty="0"/>
-                <a:t>("no values fetched");</a:t>
-              </a:r>
-            </a:p>
-            <a:p>
-              <a:r>
-                <a:rPr lang="de-DE" sz="1400" dirty="0" smtClean="0"/>
-                <a:t>        }</a:t>
-              </a:r>
-              <a:r>
-                <a:rPr lang="de-DE" sz="1400" dirty="0" err="1">
-                  <a:solidFill>
-                    <a:schemeClr val="accent2">
-                      <a:lumMod val="75000"/>
-                    </a:schemeClr>
-                  </a:solidFill>
-                </a:rPr>
-                <a:t>else</a:t>
-              </a:r>
-              <a:endParaRPr lang="de-DE" sz="1400" dirty="0">
-                <a:solidFill>
-                  <a:schemeClr val="accent2">
-                    <a:lumMod val="75000"/>
-                  </a:schemeClr>
-                </a:solidFill>
-              </a:endParaRPr>
-            </a:p>
-            <a:p>
-              <a:r>
-                <a:rPr lang="de-DE" sz="1400" dirty="0" smtClean="0"/>
-                <a:t>            </a:t>
-              </a:r>
-              <a:r>
-                <a:rPr lang="de-DE" sz="1400" dirty="0" err="1" smtClean="0">
-                  <a:solidFill>
-                    <a:schemeClr val="accent2">
-                      <a:lumMod val="75000"/>
-                    </a:schemeClr>
-                  </a:solidFill>
-                </a:rPr>
-                <a:t>return</a:t>
-              </a:r>
-              <a:r>
-                <a:rPr lang="de-DE" sz="1400" dirty="0" smtClean="0">
-                  <a:solidFill>
-                    <a:schemeClr val="accent2">
-                      <a:lumMod val="75000"/>
-                    </a:schemeClr>
-                  </a:solidFill>
-                </a:rPr>
-                <a:t> </a:t>
-              </a:r>
-              <a:r>
-                <a:rPr lang="de-DE" sz="1400" dirty="0" err="1">
-                  <a:solidFill>
-                    <a:schemeClr val="accent3">
-                      <a:lumMod val="75000"/>
-                    </a:schemeClr>
-                  </a:solidFill>
-                </a:rPr>
-                <a:t>result</a:t>
-              </a:r>
-              <a:r>
-                <a:rPr lang="de-DE" sz="1400" dirty="0" smtClean="0"/>
-                <a:t>;</a:t>
-              </a:r>
-            </a:p>
-            <a:p>
-              <a:r>
-                <a:rPr lang="de-DE" sz="1400" dirty="0"/>
-                <a:t> </a:t>
-              </a:r>
-              <a:r>
-                <a:rPr lang="de-DE" sz="1400" dirty="0" smtClean="0"/>
-                <a:t>   }</a:t>
-              </a:r>
-            </a:p>
-          </p:txBody>
-        </p:sp>
-      </p:grpSp>
-      <p:graphicFrame>
-        <p:nvGraphicFramePr>
-          <p:cNvPr id="9" name="Table 8"/>
-          <p:cNvGraphicFramePr>
-            <a:graphicFrameLocks noGrp="1"/>
-          </p:cNvGraphicFramePr>
-          <p:nvPr>
-            <p:extLst>
-              <p:ext uri="{D42A27DB-BD31-4B8C-83A1-F6EECF244321}">
-                <p14:modId xmlns:p14="http://schemas.microsoft.com/office/powerpoint/2010/main" val="1582009778"/>
-              </p:ext>
-            </p:extLst>
-          </p:nvPr>
-        </p:nvGraphicFramePr>
-        <p:xfrm>
-          <a:off x="35040" y="2571750"/>
-          <a:ext cx="2264581" cy="1686664"/>
-        </p:xfrm>
-        <a:graphic>
-          <a:graphicData uri="http://schemas.openxmlformats.org/drawingml/2006/table">
-            <a:tbl>
-              <a:tblPr firstRow="1" bandRow="1">
-                <a:tableStyleId>{5C22544A-7EE6-4342-B048-85BDC9FD1C3A}</a:tableStyleId>
-              </a:tblPr>
-              <a:tblGrid>
-                <a:gridCol w="2264581"/>
-              </a:tblGrid>
-              <a:tr h="276072">
-                <a:tc>
-                  <a:txBody>
-                    <a:bodyPr/>
-                    <a:lstStyle/>
-                    <a:p>
-                      <a:r>
-                        <a:rPr lang="de-DE" sz="1600" dirty="0" err="1" smtClean="0"/>
-                        <a:t>Context</a:t>
-                      </a:r>
-                      <a:endParaRPr lang="de-DE" sz="1600" dirty="0"/>
-                    </a:p>
-                  </a:txBody>
-                  <a:tcPr/>
-                </a:tc>
-              </a:tr>
-              <a:tr h="331312">
-                <a:tc>
-                  <a:txBody>
-                    <a:bodyPr/>
-                    <a:lstStyle/>
-                    <a:p>
-                      <a:r>
-                        <a:rPr lang="de-DE" sz="1600" dirty="0" smtClean="0"/>
-                        <a:t>Store1_Report2013</a:t>
-                      </a:r>
-                      <a:endParaRPr lang="de-DE" sz="1600" dirty="0"/>
-                    </a:p>
-                  </a:txBody>
-                  <a:tcPr/>
-                </a:tc>
-              </a:tr>
-              <a:tr h="296024">
-                <a:tc>
-                  <a:txBody>
-                    <a:bodyPr/>
-                    <a:lstStyle/>
-                    <a:p>
-                      <a:r>
-                        <a:rPr lang="de-DE" sz="1600" dirty="0" smtClean="0"/>
-                        <a:t>Store2_Report2013</a:t>
-                      </a:r>
-                      <a:endParaRPr lang="de-DE" sz="1600" dirty="0"/>
-                    </a:p>
-                  </a:txBody>
-                  <a:tcPr/>
-                </a:tc>
-              </a:tr>
-              <a:tr h="320784">
-                <a:tc>
-                  <a:txBody>
-                    <a:bodyPr/>
-                    <a:lstStyle/>
-                    <a:p>
-                      <a:r>
-                        <a:rPr lang="de-DE" sz="1600" dirty="0" err="1" smtClean="0"/>
-                        <a:t>Generated_Test</a:t>
-                      </a:r>
-                      <a:endParaRPr lang="de-DE" sz="1600" dirty="0"/>
-                    </a:p>
-                  </a:txBody>
-                  <a:tcPr/>
-                </a:tc>
-              </a:tr>
-              <a:tr h="345544">
-                <a:tc>
-                  <a:txBody>
-                    <a:bodyPr/>
-                    <a:lstStyle/>
-                    <a:p>
-                      <a:r>
-                        <a:rPr lang="de-DE" sz="1600" dirty="0" smtClean="0"/>
-                        <a:t>Store1_Forecast2014</a:t>
-                      </a:r>
-                      <a:endParaRPr lang="de-DE" sz="1600" dirty="0"/>
-                    </a:p>
-                  </a:txBody>
-                  <a:tcPr/>
-                </a:tc>
-              </a:tr>
-            </a:tbl>
-          </a:graphicData>
-        </a:graphic>
-      </p:graphicFrame>
-      <p:pic>
-        <p:nvPicPr>
-          <p:cNvPr id="10" name="Picture 9"/>
-          <p:cNvPicPr>
-            <a:picLocks noChangeAspect="1"/>
-          </p:cNvPicPr>
-          <p:nvPr/>
-        </p:nvPicPr>
-        <p:blipFill>
-          <a:blip r:embed="rId3"/>
-          <a:stretch>
-            <a:fillRect/>
-          </a:stretch>
-        </p:blipFill>
-        <p:spPr>
-          <a:xfrm>
-            <a:off x="1979712" y="3962204"/>
-            <a:ext cx="254000" cy="254000"/>
-          </a:xfrm>
-          <a:prstGeom prst="rect">
-            <a:avLst/>
-          </a:prstGeom>
-        </p:spPr>
-      </p:pic>
-      <p:pic>
-        <p:nvPicPr>
-          <p:cNvPr id="11" name="Picture 10"/>
-          <p:cNvPicPr>
-            <a:picLocks noChangeAspect="1"/>
-          </p:cNvPicPr>
-          <p:nvPr/>
-        </p:nvPicPr>
-        <p:blipFill>
-          <a:blip r:embed="rId4"/>
-          <a:stretch>
-            <a:fillRect/>
-          </a:stretch>
-        </p:blipFill>
-        <p:spPr>
-          <a:xfrm>
-            <a:off x="1945076" y="3271282"/>
-            <a:ext cx="288636" cy="288636"/>
-          </a:xfrm>
-          <a:prstGeom prst="rect">
-            <a:avLst/>
-          </a:prstGeom>
-        </p:spPr>
-      </p:pic>
-      <p:graphicFrame>
-        <p:nvGraphicFramePr>
-          <p:cNvPr id="2" name="Table 1"/>
-          <p:cNvGraphicFramePr>
-            <a:graphicFrameLocks noGrp="1"/>
-          </p:cNvGraphicFramePr>
-          <p:nvPr>
-            <p:extLst>
-              <p:ext uri="{D42A27DB-BD31-4B8C-83A1-F6EECF244321}">
-                <p14:modId xmlns:p14="http://schemas.microsoft.com/office/powerpoint/2010/main" val="3485851511"/>
-              </p:ext>
-            </p:extLst>
-          </p:nvPr>
-        </p:nvGraphicFramePr>
-        <p:xfrm>
-          <a:off x="2392260" y="3656806"/>
-          <a:ext cx="6507218" cy="1219200"/>
-        </p:xfrm>
-        <a:graphic>
-          <a:graphicData uri="http://schemas.openxmlformats.org/drawingml/2006/table">
-            <a:tbl>
-              <a:tblPr firstRow="1" bandRow="1">
-                <a:tableStyleId>{5C22544A-7EE6-4342-B048-85BDC9FD1C3A}</a:tableStyleId>
-              </a:tblPr>
-              <a:tblGrid>
-                <a:gridCol w="3253609"/>
-                <a:gridCol w="3253609"/>
-              </a:tblGrid>
-              <a:tr h="196788">
-                <a:tc>
-                  <a:txBody>
-                    <a:bodyPr/>
-                    <a:lstStyle/>
-                    <a:p>
-                      <a:r>
-                        <a:rPr lang="de-DE" sz="1400" dirty="0" err="1" smtClean="0"/>
-                        <a:t>product</a:t>
-                      </a:r>
-                      <a:endParaRPr lang="de-DE" sz="1400" dirty="0"/>
-                    </a:p>
-                  </a:txBody>
-                  <a:tcPr/>
-                </a:tc>
-                <a:tc>
-                  <a:txBody>
-                    <a:bodyPr/>
-                    <a:lstStyle/>
-                    <a:p>
-                      <a:r>
-                        <a:rPr lang="de-DE" sz="1400" dirty="0" err="1" smtClean="0"/>
-                        <a:t>value</a:t>
-                      </a:r>
-                      <a:endParaRPr lang="de-DE" sz="1400" dirty="0"/>
-                    </a:p>
-                  </a:txBody>
-                  <a:tcPr/>
-                </a:tc>
-              </a:tr>
-              <a:tr h="196788">
-                <a:tc>
-                  <a:txBody>
-                    <a:bodyPr/>
-                    <a:lstStyle/>
-                    <a:p>
-                      <a:endParaRPr lang="de-DE" sz="1400" dirty="0"/>
-                    </a:p>
-                  </a:txBody>
-                  <a:tcPr/>
-                </a:tc>
-                <a:tc>
-                  <a:txBody>
-                    <a:bodyPr/>
-                    <a:lstStyle/>
-                    <a:p>
-                      <a:endParaRPr lang="de-DE" sz="1400" dirty="0"/>
-                    </a:p>
-                  </a:txBody>
-                  <a:tcPr/>
-                </a:tc>
-              </a:tr>
-              <a:tr h="196788">
-                <a:tc>
-                  <a:txBody>
-                    <a:bodyPr/>
-                    <a:lstStyle/>
-                    <a:p>
-                      <a:endParaRPr lang="de-DE" sz="1400" dirty="0"/>
-                    </a:p>
-                  </a:txBody>
-                  <a:tcPr/>
-                </a:tc>
-                <a:tc>
-                  <a:txBody>
-                    <a:bodyPr/>
-                    <a:lstStyle/>
-                    <a:p>
-                      <a:endParaRPr lang="de-DE" sz="1400" dirty="0"/>
-                    </a:p>
-                  </a:txBody>
-                  <a:tcPr/>
-                </a:tc>
-              </a:tr>
-              <a:tr h="196788">
-                <a:tc>
-                  <a:txBody>
-                    <a:bodyPr/>
-                    <a:lstStyle/>
-                    <a:p>
-                      <a:endParaRPr lang="de-DE" sz="1400" dirty="0"/>
-                    </a:p>
-                  </a:txBody>
-                  <a:tcPr/>
-                </a:tc>
-                <a:tc>
-                  <a:txBody>
-                    <a:bodyPr/>
-                    <a:lstStyle/>
-                    <a:p>
-                      <a:endParaRPr lang="de-DE" sz="1400" dirty="0"/>
-                    </a:p>
-                  </a:txBody>
-                  <a:tcPr/>
-                </a:tc>
-              </a:tr>
-            </a:tbl>
-          </a:graphicData>
-        </a:graphic>
-      </p:graphicFrame>
-    </p:spTree>
-    <p:extLst>
-      <p:ext uri="{BB962C8B-B14F-4D97-AF65-F5344CB8AC3E}">
-        <p14:creationId xmlns:p14="http://schemas.microsoft.com/office/powerpoint/2010/main" val="2204400710"/>
-      </p:ext>
-    </p:extLst>
-  </p:cSld>
-  <p:clrMapOvr>
-    <a:masterClrMapping/>
-  </p:clrMapOvr>
-</p:sld>
-</file>
-
-<file path=ppt/slides/slide7.xml><?xml version="1.0" encoding="utf-8"?>
-<p:sld xmlns:a="http://schemas.openxmlformats.org/drawingml/2006/main" xmlns:r="http://schemas.openxmlformats.org/officeDocument/2006/relationships" xmlns:p="http://schemas.openxmlformats.org/presentationml/2006/main">
-  <p:cSld>
-    <p:spTree>
-      <p:nvGrpSpPr>
-        <p:cNvPr id="1" name=""/>
-        <p:cNvGrpSpPr/>
-        <p:nvPr/>
-      </p:nvGrpSpPr>
-      <p:grpSpPr>
-        <a:xfrm>
-          <a:off x="0" y="0"/>
-          <a:ext cx="0" cy="0"/>
-          <a:chOff x="0" y="0"/>
-          <a:chExt cx="0" cy="0"/>
-        </a:xfrm>
-      </p:grpSpPr>
-      <p:grpSp>
-        <p:nvGrpSpPr>
-          <p:cNvPr id="6" name="Group 5"/>
-          <p:cNvGrpSpPr/>
-          <p:nvPr/>
-        </p:nvGrpSpPr>
-        <p:grpSpPr>
-          <a:xfrm>
-            <a:off x="0" y="72009"/>
-            <a:ext cx="9144000" cy="4953295"/>
-            <a:chOff x="0" y="72009"/>
-            <a:chExt cx="9144000" cy="4953295"/>
-          </a:xfrm>
-        </p:grpSpPr>
-        <p:pic>
-          <p:nvPicPr>
-            <p:cNvPr id="1031" name="Picture 7"/>
-            <p:cNvPicPr>
-              <a:picLocks noChangeAspect="1" noChangeArrowheads="1"/>
-            </p:cNvPicPr>
-            <p:nvPr/>
-          </p:nvPicPr>
-          <p:blipFill>
-            <a:blip r:embed="rId2">
-              <a:extLst>
-                <a:ext uri="{28A0092B-C50C-407E-A947-70E740481C1C}">
-                  <a14:useLocalDpi xmlns:a14="http://schemas.microsoft.com/office/drawing/2010/main" val="0"/>
-                </a:ext>
-              </a:extLst>
-            </a:blip>
-            <a:srcRect/>
-            <a:stretch>
-              <a:fillRect/>
-            </a:stretch>
-          </p:blipFill>
-          <p:spPr bwMode="auto">
-            <a:xfrm>
-              <a:off x="0" y="72009"/>
-              <a:ext cx="9144000" cy="4953295"/>
-            </a:xfrm>
-            <a:prstGeom prst="rect">
-              <a:avLst/>
-            </a:prstGeom>
-            <a:noFill/>
-            <a:ln>
-              <a:noFill/>
-            </a:ln>
-            <a:effectLst/>
-            <a:extLst>
-              <a:ext uri="{909E8E84-426E-40DD-AFC4-6F175D3DCCD1}">
-                <a14:hiddenFill xmlns:a14="http://schemas.microsoft.com/office/drawing/2010/main">
-                  <a:solidFill>
-                    <a:schemeClr val="accent1"/>
-                  </a:solidFill>
-                </a14:hiddenFill>
-              </a:ext>
-              <a:ext uri="{91240B29-F687-4F45-9708-019B960494DF}">
-                <a14:hiddenLine xmlns:a14="http://schemas.microsoft.com/office/drawing/2010/main" w="9525">
-                  <a:solidFill>
-                    <a:schemeClr val="tx1"/>
-                  </a:solidFill>
-                  <a:miter lim="800000"/>
-                  <a:headEnd/>
-                  <a:tailEnd/>
-                </a14:hiddenLine>
-              </a:ext>
-              <a:ext uri="{AF507438-7753-43E0-B8FC-AC1667EBCBE1}">
-                <a14:hiddenEffects xmlns:a14="http://schemas.microsoft.com/office/drawing/2010/main">
-                  <a:effectLst>
-                    <a:outerShdw dist="35921" dir="2700000" algn="ctr" rotWithShape="0">
-                      <a:schemeClr val="bg2"/>
-                    </a:outerShdw>
-                  </a:effectLst>
-                </a14:hiddenEffects>
-              </a:ext>
-            </a:extLst>
-          </p:spPr>
-        </p:pic>
-        <p:sp>
-          <p:nvSpPr>
-            <p:cNvPr id="5" name="Rounded Rectangle 4"/>
-            <p:cNvSpPr/>
-            <p:nvPr/>
-          </p:nvSpPr>
-          <p:spPr>
-            <a:xfrm>
-              <a:off x="2370528" y="3501504"/>
-              <a:ext cx="6590828" cy="1404000"/>
-            </a:xfrm>
-            <a:prstGeom prst="roundRect">
-              <a:avLst>
-                <a:gd name="adj" fmla="val 2673"/>
-              </a:avLst>
-            </a:prstGeom>
-            <a:solidFill>
-              <a:schemeClr val="bg1"/>
-            </a:solidFill>
-            <a:ln>
-              <a:noFill/>
-            </a:ln>
-          </p:spPr>
-          <p:style>
-            <a:lnRef idx="2">
-              <a:schemeClr val="accent1">
-                <a:shade val="50000"/>
-              </a:schemeClr>
-            </a:lnRef>
-            <a:fillRef idx="1">
-              <a:schemeClr val="accent1"/>
-            </a:fillRef>
-            <a:effectRef idx="0">
-              <a:schemeClr val="accent1"/>
-            </a:effectRef>
-            <a:fontRef idx="minor">
-              <a:schemeClr val="lt1"/>
-            </a:fontRef>
-          </p:style>
-          <p:txBody>
-            <a:bodyPr rtlCol="0" anchor="ctr"/>
-            <a:lstStyle/>
-            <a:p>
-              <a:pPr algn="ctr"/>
-              <a:endParaRPr lang="de-DE"/>
-            </a:p>
-          </p:txBody>
-        </p:sp>
-        <p:sp>
-          <p:nvSpPr>
-            <p:cNvPr id="12" name="Rounded Rectangle 11"/>
-            <p:cNvSpPr/>
-            <p:nvPr/>
-          </p:nvSpPr>
-          <p:spPr>
-            <a:xfrm>
-              <a:off x="22340" y="2561584"/>
-              <a:ext cx="2293200" cy="2347200"/>
-            </a:xfrm>
-            <a:prstGeom prst="roundRect">
-              <a:avLst>
-                <a:gd name="adj" fmla="val 1368"/>
-              </a:avLst>
-            </a:prstGeom>
-            <a:solidFill>
-              <a:schemeClr val="bg1"/>
-            </a:solidFill>
-            <a:ln>
-              <a:noFill/>
-            </a:ln>
-          </p:spPr>
-          <p:style>
-            <a:lnRef idx="2">
-              <a:schemeClr val="accent1">
-                <a:shade val="50000"/>
-              </a:schemeClr>
-            </a:lnRef>
-            <a:fillRef idx="1">
-              <a:schemeClr val="accent1"/>
-            </a:fillRef>
-            <a:effectRef idx="0">
-              <a:schemeClr val="accent1"/>
-            </a:effectRef>
-            <a:fontRef idx="minor">
-              <a:schemeClr val="lt1"/>
-            </a:fontRef>
-          </p:style>
-          <p:txBody>
-            <a:bodyPr rtlCol="0" anchor="ctr"/>
-            <a:lstStyle/>
-            <a:p>
-              <a:pPr algn="ctr"/>
-              <a:endParaRPr lang="de-DE"/>
-            </a:p>
-          </p:txBody>
-        </p:sp>
-      </p:grpSp>
-      <p:graphicFrame>
-        <p:nvGraphicFramePr>
-          <p:cNvPr id="2" name="Table 1"/>
-          <p:cNvGraphicFramePr>
-            <a:graphicFrameLocks noGrp="1"/>
-          </p:cNvGraphicFramePr>
-          <p:nvPr>
-            <p:extLst>
-              <p:ext uri="{D42A27DB-BD31-4B8C-83A1-F6EECF244321}">
-                <p14:modId xmlns:p14="http://schemas.microsoft.com/office/powerpoint/2010/main" val="1580077069"/>
-              </p:ext>
-            </p:extLst>
-          </p:nvPr>
-        </p:nvGraphicFramePr>
-        <p:xfrm>
-          <a:off x="35040" y="2571750"/>
-          <a:ext cx="2264581" cy="1686664"/>
-        </p:xfrm>
-        <a:graphic>
-          <a:graphicData uri="http://schemas.openxmlformats.org/drawingml/2006/table">
-            <a:tbl>
-              <a:tblPr firstRow="1" bandRow="1">
-                <a:tableStyleId>{5C22544A-7EE6-4342-B048-85BDC9FD1C3A}</a:tableStyleId>
-              </a:tblPr>
-              <a:tblGrid>
-                <a:gridCol w="2264581"/>
-              </a:tblGrid>
-              <a:tr h="276072">
-                <a:tc>
-                  <a:txBody>
-                    <a:bodyPr/>
-                    <a:lstStyle/>
-                    <a:p>
-                      <a:r>
-                        <a:rPr lang="de-DE" sz="1600" dirty="0" err="1" smtClean="0"/>
-                        <a:t>Context</a:t>
-                      </a:r>
-                      <a:endParaRPr lang="de-DE" sz="1600" dirty="0"/>
-                    </a:p>
-                  </a:txBody>
-                  <a:tcPr/>
-                </a:tc>
-              </a:tr>
-              <a:tr h="331312">
-                <a:tc>
-                  <a:txBody>
-                    <a:bodyPr/>
-                    <a:lstStyle/>
-                    <a:p>
-                      <a:r>
-                        <a:rPr lang="de-DE" sz="1600" dirty="0" smtClean="0"/>
-                        <a:t>Store1_Report2013</a:t>
-                      </a:r>
-                      <a:endParaRPr lang="de-DE" sz="1600" dirty="0"/>
-                    </a:p>
-                  </a:txBody>
-                  <a:tcPr/>
-                </a:tc>
-              </a:tr>
-              <a:tr h="296024">
-                <a:tc>
-                  <a:txBody>
-                    <a:bodyPr/>
-                    <a:lstStyle/>
-                    <a:p>
-                      <a:r>
-                        <a:rPr lang="de-DE" sz="1600" dirty="0" smtClean="0"/>
-                        <a:t>Store2_Report2013</a:t>
-                      </a:r>
-                      <a:endParaRPr lang="de-DE" sz="1600" dirty="0"/>
-                    </a:p>
-                  </a:txBody>
-                  <a:tcPr/>
-                </a:tc>
-              </a:tr>
-              <a:tr h="320784">
-                <a:tc>
-                  <a:txBody>
-                    <a:bodyPr/>
-                    <a:lstStyle/>
-                    <a:p>
-                      <a:r>
-                        <a:rPr lang="de-DE" sz="1600" dirty="0" err="1" smtClean="0"/>
-                        <a:t>Generated_Test</a:t>
-                      </a:r>
-                      <a:endParaRPr lang="de-DE" sz="1600" dirty="0"/>
-                    </a:p>
-                  </a:txBody>
-                  <a:tcPr/>
-                </a:tc>
-              </a:tr>
-              <a:tr h="345544">
-                <a:tc>
-                  <a:txBody>
-                    <a:bodyPr/>
-                    <a:lstStyle/>
-                    <a:p>
-                      <a:r>
-                        <a:rPr lang="de-DE" sz="1600" dirty="0" smtClean="0"/>
-                        <a:t>Store1_Forecast2014</a:t>
-                      </a:r>
-                      <a:endParaRPr lang="de-DE" sz="1600" dirty="0"/>
-                    </a:p>
-                  </a:txBody>
-                  <a:tcPr/>
-                </a:tc>
-              </a:tr>
-            </a:tbl>
-          </a:graphicData>
-        </a:graphic>
-      </p:graphicFrame>
-      <p:pic>
-        <p:nvPicPr>
-          <p:cNvPr id="8" name="table"/>
-          <p:cNvPicPr>
-            <a:picLocks noChangeAspect="1"/>
-          </p:cNvPicPr>
-          <p:nvPr/>
-        </p:nvPicPr>
-        <p:blipFill>
-          <a:blip r:embed="rId3"/>
-          <a:stretch>
-            <a:fillRect/>
-          </a:stretch>
-        </p:blipFill>
-        <p:spPr>
-          <a:xfrm>
-            <a:off x="4198681" y="3297178"/>
-            <a:ext cx="2921001" cy="1371600"/>
-          </a:xfrm>
-          <a:prstGeom prst="rect">
-            <a:avLst/>
-          </a:prstGeom>
-        </p:spPr>
-      </p:pic>
       <p:sp>
         <p:nvSpPr>
-          <p:cNvPr id="9" name="TextBox 3"/>
-          <p:cNvSpPr txBox="1"/>
+          <p:cNvPr id="29" name="Rectangle 28"/>
+          <p:cNvSpPr/>
           <p:nvPr/>
         </p:nvSpPr>
         <p:spPr>
           <a:xfrm>
-            <a:off x="4198681" y="4707570"/>
-            <a:ext cx="2921001" cy="276999"/>
+            <a:off x="8533509" y="2633440"/>
+            <a:ext cx="150262" cy="384987"/>
           </a:xfrm>
           <a:prstGeom prst="rect">
             <a:avLst/>
           </a:prstGeom>
           <a:solidFill>
-            <a:schemeClr val="bg1">
-              <a:lumMod val="85000"/>
+            <a:srgbClr val="C00000"/>
+          </a:solidFill>
+          <a:ln>
+            <a:noFill/>
+          </a:ln>
+        </p:spPr>
+        <p:style>
+          <a:lnRef idx="2">
+            <a:schemeClr val="accent1">
+              <a:shade val="50000"/>
             </a:schemeClr>
-          </a:solidFill>
-        </p:spPr>
+          </a:lnRef>
+          <a:fillRef idx="1">
+            <a:schemeClr val="accent1"/>
+          </a:fillRef>
+          <a:effectRef idx="0">
+            <a:schemeClr val="accent1"/>
+          </a:effectRef>
+          <a:fontRef idx="minor">
+            <a:schemeClr val="lt1"/>
+          </a:fontRef>
+        </p:style>
         <p:txBody>
-          <a:bodyPr wrap="square" rtlCol="0">
-            <a:spAutoFit/>
-          </a:bodyPr>
-          <a:lstStyle>
-            <a:defPPr>
-              <a:defRPr lang="en-US"/>
-            </a:defPPr>
-            <a:lvl1pPr marL="0" algn="l" defTabSz="457200" rtl="0" eaLnBrk="1" latinLnBrk="0" hangingPunct="1">
-              <a:defRPr sz="1800" kern="1200">
-                <a:solidFill>
-                  <a:schemeClr val="tx1"/>
-                </a:solidFill>
-                <a:latin typeface="+mn-lt"/>
-                <a:ea typeface="+mn-ea"/>
-                <a:cs typeface="+mn-cs"/>
-              </a:defRPr>
-            </a:lvl1pPr>
-            <a:lvl2pPr marL="457200" algn="l" defTabSz="457200" rtl="0" eaLnBrk="1" latinLnBrk="0" hangingPunct="1">
-              <a:defRPr sz="1800" kern="1200">
-                <a:solidFill>
-                  <a:schemeClr val="tx1"/>
-                </a:solidFill>
-                <a:latin typeface="+mn-lt"/>
-                <a:ea typeface="+mn-ea"/>
-                <a:cs typeface="+mn-cs"/>
-              </a:defRPr>
-            </a:lvl2pPr>
-            <a:lvl3pPr marL="914400" algn="l" defTabSz="457200" rtl="0" eaLnBrk="1" latinLnBrk="0" hangingPunct="1">
-              <a:defRPr sz="1800" kern="1200">
-                <a:solidFill>
-                  <a:schemeClr val="tx1"/>
-                </a:solidFill>
-                <a:latin typeface="+mn-lt"/>
-                <a:ea typeface="+mn-ea"/>
-                <a:cs typeface="+mn-cs"/>
-              </a:defRPr>
-            </a:lvl3pPr>
-            <a:lvl4pPr marL="1371600" algn="l" defTabSz="457200" rtl="0" eaLnBrk="1" latinLnBrk="0" hangingPunct="1">
-              <a:defRPr sz="1800" kern="1200">
-                <a:solidFill>
-                  <a:schemeClr val="tx1"/>
-                </a:solidFill>
-                <a:latin typeface="+mn-lt"/>
-                <a:ea typeface="+mn-ea"/>
-                <a:cs typeface="+mn-cs"/>
-              </a:defRPr>
-            </a:lvl4pPr>
-            <a:lvl5pPr marL="1828800" algn="l" defTabSz="457200" rtl="0" eaLnBrk="1" latinLnBrk="0" hangingPunct="1">
-              <a:defRPr sz="1800" kern="1200">
-                <a:solidFill>
-                  <a:schemeClr val="tx1"/>
-                </a:solidFill>
-                <a:latin typeface="+mn-lt"/>
-                <a:ea typeface="+mn-ea"/>
-                <a:cs typeface="+mn-cs"/>
-              </a:defRPr>
-            </a:lvl5pPr>
-            <a:lvl6pPr marL="2286000" algn="l" defTabSz="457200" rtl="0" eaLnBrk="1" latinLnBrk="0" hangingPunct="1">
-              <a:defRPr sz="1800" kern="1200">
-                <a:solidFill>
-                  <a:schemeClr val="tx1"/>
-                </a:solidFill>
-                <a:latin typeface="+mn-lt"/>
-                <a:ea typeface="+mn-ea"/>
-                <a:cs typeface="+mn-cs"/>
-              </a:defRPr>
-            </a:lvl6pPr>
-            <a:lvl7pPr marL="2743200" algn="l" defTabSz="457200" rtl="0" eaLnBrk="1" latinLnBrk="0" hangingPunct="1">
-              <a:defRPr sz="1800" kern="1200">
-                <a:solidFill>
-                  <a:schemeClr val="tx1"/>
-                </a:solidFill>
-                <a:latin typeface="+mn-lt"/>
-                <a:ea typeface="+mn-ea"/>
-                <a:cs typeface="+mn-cs"/>
-              </a:defRPr>
-            </a:lvl7pPr>
-            <a:lvl8pPr marL="3200400" algn="l" defTabSz="457200" rtl="0" eaLnBrk="1" latinLnBrk="0" hangingPunct="1">
-              <a:defRPr sz="1800" kern="1200">
-                <a:solidFill>
-                  <a:schemeClr val="tx1"/>
-                </a:solidFill>
-                <a:latin typeface="+mn-lt"/>
-                <a:ea typeface="+mn-ea"/>
-                <a:cs typeface="+mn-cs"/>
-              </a:defRPr>
-            </a:lvl8pPr>
-            <a:lvl9pPr marL="3657600" algn="l" defTabSz="457200" rtl="0" eaLnBrk="1" latinLnBrk="0" hangingPunct="1">
-              <a:defRPr sz="1800" kern="1200">
-                <a:solidFill>
-                  <a:schemeClr val="tx1"/>
-                </a:solidFill>
-                <a:latin typeface="+mn-lt"/>
-                <a:ea typeface="+mn-ea"/>
-                <a:cs typeface="+mn-cs"/>
-              </a:defRPr>
-            </a:lvl9pPr>
-          </a:lstStyle>
-          <a:p>
-            <a:r>
-              <a:rPr lang="en-US" sz="1200" dirty="0" smtClean="0"/>
-              <a:t>#of tuples: 4m		Fetch time: 10s</a:t>
-            </a:r>
+          <a:bodyPr rtlCol="0" anchor="ctr"/>
+          <a:lstStyle/>
+          <a:p>
+            <a:pPr algn="ctr"/>
+            <a:endParaRPr lang="de-DE"/>
           </a:p>
         </p:txBody>
       </p:sp>
-      <p:pic>
-        <p:nvPicPr>
-          <p:cNvPr id="13" name="Picture 12"/>
-          <p:cNvPicPr>
-            <a:picLocks noChangeAspect="1"/>
-          </p:cNvPicPr>
-          <p:nvPr/>
-        </p:nvPicPr>
-        <p:blipFill>
-          <a:blip r:embed="rId4"/>
-          <a:stretch>
-            <a:fillRect/>
-          </a:stretch>
-        </p:blipFill>
-        <p:spPr>
-          <a:xfrm>
-            <a:off x="6156176" y="4382473"/>
-            <a:ext cx="254000" cy="254000"/>
-          </a:xfrm>
-          <a:prstGeom prst="rect">
-            <a:avLst/>
-          </a:prstGeom>
-        </p:spPr>
-      </p:pic>
-      <p:pic>
-        <p:nvPicPr>
-          <p:cNvPr id="14" name="Picture 13"/>
-          <p:cNvPicPr>
-            <a:picLocks noChangeAspect="1"/>
-          </p:cNvPicPr>
-          <p:nvPr/>
-        </p:nvPicPr>
-        <p:blipFill>
-          <a:blip r:embed="rId5"/>
-          <a:stretch>
-            <a:fillRect/>
-          </a:stretch>
-        </p:blipFill>
-        <p:spPr>
-          <a:xfrm>
-            <a:off x="6719538" y="4686365"/>
-            <a:ext cx="288636" cy="288636"/>
-          </a:xfrm>
-          <a:prstGeom prst="rect">
-            <a:avLst/>
-          </a:prstGeom>
-        </p:spPr>
-      </p:pic>
     </p:spTree>
     <p:extLst>
       <p:ext uri="{BB962C8B-B14F-4D97-AF65-F5344CB8AC3E}">
-        <p14:creationId xmlns:p14="http://schemas.microsoft.com/office/powerpoint/2010/main" val="140010103"/>
-      </p:ext>
-    </p:extLst>
-  </p:cSld>
-  <p:clrMapOvr>
-    <a:masterClrMapping/>
-  </p:clrMapOvr>
-</p:sld>
-</file>
-
-<file path=ppt/slides/slide8.xml><?xml version="1.0" encoding="utf-8"?>
-<p:sld xmlns:a="http://schemas.openxmlformats.org/drawingml/2006/main" xmlns:r="http://schemas.openxmlformats.org/officeDocument/2006/relationships" xmlns:p="http://schemas.openxmlformats.org/presentationml/2006/main">
-  <p:cSld>
-    <p:spTree>
-      <p:nvGrpSpPr>
-        <p:cNvPr id="1" name=""/>
-        <p:cNvGrpSpPr/>
-        <p:nvPr/>
-      </p:nvGrpSpPr>
-      <p:grpSpPr>
-        <a:xfrm>
-          <a:off x="0" y="0"/>
-          <a:ext cx="0" cy="0"/>
-          <a:chOff x="0" y="0"/>
-          <a:chExt cx="0" cy="0"/>
-        </a:xfrm>
-      </p:grpSpPr>
-      <p:pic>
-        <p:nvPicPr>
-          <p:cNvPr id="2052" name="Picture 4"/>
-          <p:cNvPicPr>
-            <a:picLocks noChangeAspect="1" noChangeArrowheads="1"/>
-          </p:cNvPicPr>
-          <p:nvPr/>
-        </p:nvPicPr>
-        <p:blipFill>
-          <a:blip r:embed="rId2">
-            <a:extLst>
-              <a:ext uri="{28A0092B-C50C-407E-A947-70E740481C1C}">
-                <a14:useLocalDpi xmlns:a14="http://schemas.microsoft.com/office/drawing/2010/main" val="0"/>
-              </a:ext>
-            </a:extLst>
-          </a:blip>
-          <a:srcRect/>
-          <a:stretch>
-            <a:fillRect/>
-          </a:stretch>
-        </p:blipFill>
-        <p:spPr bwMode="auto">
-          <a:xfrm>
-            <a:off x="0" y="0"/>
-            <a:ext cx="16424275" cy="8896350"/>
-          </a:xfrm>
-          <a:prstGeom prst="rect">
-            <a:avLst/>
-          </a:prstGeom>
-          <a:noFill/>
-          <a:ln>
-            <a:noFill/>
-          </a:ln>
-          <a:effectLst/>
-          <a:extLst>
-            <a:ext uri="{909E8E84-426E-40DD-AFC4-6F175D3DCCD1}">
-              <a14:hiddenFill xmlns:a14="http://schemas.microsoft.com/office/drawing/2010/main">
-                <a:solidFill>
-                  <a:schemeClr val="accent1"/>
-                </a:solidFill>
-              </a14:hiddenFill>
-            </a:ext>
-            <a:ext uri="{91240B29-F687-4F45-9708-019B960494DF}">
-              <a14:hiddenLine xmlns:a14="http://schemas.microsoft.com/office/drawing/2010/main" w="9525">
-                <a:solidFill>
-                  <a:schemeClr val="tx1"/>
-                </a:solidFill>
-                <a:miter lim="800000"/>
-                <a:headEnd/>
-                <a:tailEnd/>
-              </a14:hiddenLine>
-            </a:ext>
-            <a:ext uri="{AF507438-7753-43E0-B8FC-AC1667EBCBE1}">
-              <a14:hiddenEffects xmlns:a14="http://schemas.microsoft.com/office/drawing/2010/main">
-                <a:effectLst>
-                  <a:outerShdw dist="35921" dir="2700000" algn="ctr" rotWithShape="0">
-                    <a:schemeClr val="bg2"/>
-                  </a:outerShdw>
-                </a:effectLst>
-              </a14:hiddenEffects>
-            </a:ext>
-          </a:extLst>
-        </p:spPr>
-      </p:pic>
-    </p:spTree>
-    <p:extLst>
-      <p:ext uri="{BB962C8B-B14F-4D97-AF65-F5344CB8AC3E}">
-        <p14:creationId xmlns:p14="http://schemas.microsoft.com/office/powerpoint/2010/main" val="1623818981"/>
+        <p14:creationId xmlns:p14="http://schemas.microsoft.com/office/powerpoint/2010/main" val="3253654236"/>
       </p:ext>
     </p:extLst>
   </p:cSld>

</xml_diff>